<commit_message>
Service Oriented Architecture Slides
</commit_message>
<xml_diff>
--- a/ServiceOrientedArchitecture/Service Oriented Architecture.pptx
+++ b/ServiceOrientedArchitecture/Service Oriented Architecture.pptx
@@ -2904,8 +2904,8 @@
     <dgm:cxn modelId="{3E1A2BE0-4B70-4ED8-8390-2A24FA3E2CB5}" type="presOf" srcId="{45FA9B21-4CA5-4B8D-8715-2752D3F0B675}" destId="{D19582C4-3FEC-4FD5-B0AE-8D9521942EA8}" srcOrd="1" destOrd="0" presId="urn:microsoft.com/office/officeart/2005/8/layout/hProcess4"/>
     <dgm:cxn modelId="{D7B472A2-B925-4BFC-B4B0-D793286929D4}" srcId="{49623A79-E22C-4BD1-A687-7D079D6A99A9}" destId="{4A861E70-6DF6-4CFB-B043-0E8799441DB4}" srcOrd="1" destOrd="0" parTransId="{2753FFD0-C13A-43B3-A3C0-C4648483DA99}" sibTransId="{232E6A13-9072-4538-8214-14FBE947A4DE}"/>
     <dgm:cxn modelId="{F26AABCE-F54B-4469-BC19-6D58F3C3429A}" type="presOf" srcId="{54D9F9BD-9D88-4CE3-A024-916FF25DA047}" destId="{758B2B73-B980-440E-AF57-2FE7464F11DE}" srcOrd="1" destOrd="0" presId="urn:microsoft.com/office/officeart/2005/8/layout/hProcess4"/>
+    <dgm:cxn modelId="{F63AC2F4-9AE8-47D2-91FA-99506BD87999}" type="presOf" srcId="{52D53BA1-188C-4F45-942D-FEBBB6D4BA53}" destId="{5ED24A8C-48F7-42F7-9663-FD09B3C9E1F1}" srcOrd="0" destOrd="0" presId="urn:microsoft.com/office/officeart/2005/8/layout/hProcess4"/>
     <dgm:cxn modelId="{A60BC340-CC91-4F7C-8976-23212708FD86}" srcId="{F5DB5329-0796-4179-AF2D-9478BE30ADB9}" destId="{54D9F9BD-9D88-4CE3-A024-916FF25DA047}" srcOrd="0" destOrd="0" parTransId="{CF0DC812-7A14-46DC-A0BA-417990186444}" sibTransId="{572651BA-937B-4C3B-B389-222A65FD6413}"/>
-    <dgm:cxn modelId="{F63AC2F4-9AE8-47D2-91FA-99506BD87999}" type="presOf" srcId="{52D53BA1-188C-4F45-942D-FEBBB6D4BA53}" destId="{5ED24A8C-48F7-42F7-9663-FD09B3C9E1F1}" srcOrd="0" destOrd="0" presId="urn:microsoft.com/office/officeart/2005/8/layout/hProcess4"/>
     <dgm:cxn modelId="{7550023D-63FD-4B81-BC1F-27EA24056539}" type="presOf" srcId="{49623A79-E22C-4BD1-A687-7D079D6A99A9}" destId="{5F2C6B1F-EEC8-47CF-AFCF-173EBD5FE8A9}" srcOrd="0" destOrd="0" presId="urn:microsoft.com/office/officeart/2005/8/layout/hProcess4"/>
     <dgm:cxn modelId="{6E17DA94-386F-44B4-8628-717E2C00DE72}" type="presOf" srcId="{4A861E70-6DF6-4CFB-B043-0E8799441DB4}" destId="{50BCD8B4-8C61-4CDE-A56B-06D0CA4C4B58}" srcOrd="0" destOrd="0" presId="urn:microsoft.com/office/officeart/2005/8/layout/hProcess4"/>
     <dgm:cxn modelId="{F40CCAD0-A9CB-4CFA-8D04-F3EDD4F856B4}" srcId="{49623A79-E22C-4BD1-A687-7D079D6A99A9}" destId="{F5DB5329-0796-4179-AF2D-9478BE30ADB9}" srcOrd="0" destOrd="0" parTransId="{D47340C7-5484-4F6F-BB8C-366B33F41CDB}" sibTransId="{82B9EDEF-B5C0-4F19-8BA7-D284CBA5DF5A}"/>
@@ -4155,576 +4155,6 @@
       <dsp:cNvGrpSpPr/>
     </dsp:nvGrpSpPr>
     <dsp:grpSpPr/>
-    <dsp:sp modelId="{6EE815F1-6D64-4196-8401-9C0B24CE7363}">
-      <dsp:nvSpPr>
-        <dsp:cNvPr id="0" name=""/>
-        <dsp:cNvSpPr/>
-      </dsp:nvSpPr>
-      <dsp:spPr>
-        <a:xfrm>
-          <a:off x="1842" y="1376749"/>
-          <a:ext cx="2225975" cy="1835964"/>
-        </a:xfrm>
-        <a:prstGeom prst="roundRect">
-          <a:avLst>
-            <a:gd name="adj" fmla="val 10000"/>
-          </a:avLst>
-        </a:prstGeom>
-        <a:solidFill>
-          <a:schemeClr val="lt1">
-            <a:alpha val="90000"/>
-            <a:hueOff val="0"/>
-            <a:satOff val="0"/>
-            <a:lumOff val="0"/>
-            <a:alphaOff val="0"/>
-          </a:schemeClr>
-        </a:solidFill>
-        <a:ln w="25400" cap="flat" cmpd="sng" algn="ctr">
-          <a:solidFill>
-            <a:schemeClr val="accent1">
-              <a:hueOff val="0"/>
-              <a:satOff val="0"/>
-              <a:lumOff val="0"/>
-              <a:alphaOff val="0"/>
-            </a:schemeClr>
-          </a:solidFill>
-          <a:prstDash val="solid"/>
-        </a:ln>
-        <a:effectLst/>
-      </dsp:spPr>
-      <dsp:style>
-        <a:lnRef idx="2">
-          <a:scrgbClr r="0" g="0" b="0"/>
-        </a:lnRef>
-        <a:fillRef idx="1">
-          <a:scrgbClr r="0" g="0" b="0"/>
-        </a:fillRef>
-        <a:effectRef idx="0">
-          <a:scrgbClr r="0" g="0" b="0"/>
-        </a:effectRef>
-        <a:fontRef idx="minor"/>
-      </dsp:style>
-      <dsp:txBody>
-        <a:bodyPr spcFirstLastPara="0" vert="horz" wrap="square" lIns="53340" tIns="53340" rIns="53340" bIns="53340" numCol="1" spcCol="1270" anchor="t" anchorCtr="0">
-          <a:noAutofit/>
-        </a:bodyPr>
-        <a:lstStyle/>
-        <a:p>
-          <a:pPr marL="285750" lvl="1" indent="-285750" algn="l" defTabSz="1244600">
-            <a:lnSpc>
-              <a:spcPct val="90000"/>
-            </a:lnSpc>
-            <a:spcBef>
-              <a:spcPct val="0"/>
-            </a:spcBef>
-            <a:spcAft>
-              <a:spcPct val="15000"/>
-            </a:spcAft>
-            <a:buChar char="••"/>
-          </a:pPr>
-          <a:r>
-            <a:rPr lang="en-US" sz="2800" kern="1200" dirty="0" smtClean="0"/>
-            <a:t>Create Request for profile</a:t>
-          </a:r>
-          <a:endParaRPr lang="en-US" sz="2800" kern="1200" dirty="0"/>
-        </a:p>
-      </dsp:txBody>
-      <dsp:txXfrm>
-        <a:off x="1842" y="1376749"/>
-        <a:ext cx="2225975" cy="1442543"/>
-      </dsp:txXfrm>
-    </dsp:sp>
-    <dsp:sp modelId="{72BD51F2-6274-491B-8B03-E816D3636284}">
-      <dsp:nvSpPr>
-        <dsp:cNvPr id="0" name=""/>
-        <dsp:cNvSpPr/>
-      </dsp:nvSpPr>
-      <dsp:spPr>
-        <a:xfrm>
-          <a:off x="1264508" y="1856131"/>
-          <a:ext cx="2392624" cy="2392624"/>
-        </a:xfrm>
-        <a:prstGeom prst="leftCircularArrow">
-          <a:avLst>
-            <a:gd name="adj1" fmla="val 2896"/>
-            <a:gd name="adj2" fmla="val 354252"/>
-            <a:gd name="adj3" fmla="val 2129763"/>
-            <a:gd name="adj4" fmla="val 9024489"/>
-            <a:gd name="adj5" fmla="val 3379"/>
-          </a:avLst>
-        </a:prstGeom>
-        <a:solidFill>
-          <a:schemeClr val="accent1">
-            <a:tint val="60000"/>
-            <a:hueOff val="0"/>
-            <a:satOff val="0"/>
-            <a:lumOff val="0"/>
-            <a:alphaOff val="0"/>
-          </a:schemeClr>
-        </a:solidFill>
-        <a:ln>
-          <a:noFill/>
-        </a:ln>
-        <a:effectLst/>
-      </dsp:spPr>
-      <dsp:style>
-        <a:lnRef idx="0">
-          <a:scrgbClr r="0" g="0" b="0"/>
-        </a:lnRef>
-        <a:fillRef idx="1">
-          <a:scrgbClr r="0" g="0" b="0"/>
-        </a:fillRef>
-        <a:effectRef idx="0">
-          <a:scrgbClr r="0" g="0" b="0"/>
-        </a:effectRef>
-        <a:fontRef idx="minor">
-          <a:schemeClr val="lt1"/>
-        </a:fontRef>
-      </dsp:style>
-    </dsp:sp>
-    <dsp:sp modelId="{69EE502B-58DE-44AF-ABA0-822DBC342A54}">
-      <dsp:nvSpPr>
-        <dsp:cNvPr id="0" name=""/>
-        <dsp:cNvSpPr/>
-      </dsp:nvSpPr>
-      <dsp:spPr>
-        <a:xfrm>
-          <a:off x="496503" y="2819292"/>
-          <a:ext cx="1978645" cy="786841"/>
-        </a:xfrm>
-        <a:prstGeom prst="roundRect">
-          <a:avLst>
-            <a:gd name="adj" fmla="val 10000"/>
-          </a:avLst>
-        </a:prstGeom>
-        <a:solidFill>
-          <a:schemeClr val="accent1">
-            <a:hueOff val="0"/>
-            <a:satOff val="0"/>
-            <a:lumOff val="0"/>
-            <a:alphaOff val="0"/>
-          </a:schemeClr>
-        </a:solidFill>
-        <a:ln w="25400" cap="flat" cmpd="sng" algn="ctr">
-          <a:solidFill>
-            <a:schemeClr val="lt1">
-              <a:hueOff val="0"/>
-              <a:satOff val="0"/>
-              <a:lumOff val="0"/>
-              <a:alphaOff val="0"/>
-            </a:schemeClr>
-          </a:solidFill>
-          <a:prstDash val="solid"/>
-        </a:ln>
-        <a:effectLst/>
-      </dsp:spPr>
-      <dsp:style>
-        <a:lnRef idx="2">
-          <a:scrgbClr r="0" g="0" b="0"/>
-        </a:lnRef>
-        <a:fillRef idx="1">
-          <a:scrgbClr r="0" g="0" b="0"/>
-        </a:fillRef>
-        <a:effectRef idx="0">
-          <a:scrgbClr r="0" g="0" b="0"/>
-        </a:effectRef>
-        <a:fontRef idx="minor">
-          <a:schemeClr val="lt1"/>
-        </a:fontRef>
-      </dsp:style>
-      <dsp:txBody>
-        <a:bodyPr spcFirstLastPara="0" vert="horz" wrap="square" lIns="64770" tIns="43180" rIns="64770" bIns="43180" numCol="1" spcCol="1270" anchor="ctr" anchorCtr="0">
-          <a:noAutofit/>
-        </a:bodyPr>
-        <a:lstStyle/>
-        <a:p>
-          <a:pPr lvl="0" algn="ctr" defTabSz="1511300">
-            <a:lnSpc>
-              <a:spcPct val="90000"/>
-            </a:lnSpc>
-            <a:spcBef>
-              <a:spcPct val="0"/>
-            </a:spcBef>
-            <a:spcAft>
-              <a:spcPct val="35000"/>
-            </a:spcAft>
-          </a:pPr>
-          <a:r>
-            <a:rPr lang="en-US" sz="3400" kern="1200" dirty="0" smtClean="0"/>
-            <a:t>Consumer</a:t>
-          </a:r>
-          <a:endParaRPr lang="en-US" sz="3400" kern="1200" dirty="0"/>
-        </a:p>
-      </dsp:txBody>
-      <dsp:txXfrm>
-        <a:off x="496503" y="2819292"/>
-        <a:ext cx="1978645" cy="786841"/>
-      </dsp:txXfrm>
-    </dsp:sp>
-    <dsp:sp modelId="{5ED24A8C-48F7-42F7-9663-FD09B3C9E1F1}">
-      <dsp:nvSpPr>
-        <dsp:cNvPr id="0" name=""/>
-        <dsp:cNvSpPr/>
-      </dsp:nvSpPr>
-      <dsp:spPr>
-        <a:xfrm>
-          <a:off x="2805121" y="1376749"/>
-          <a:ext cx="2225975" cy="1835964"/>
-        </a:xfrm>
-        <a:prstGeom prst="roundRect">
-          <a:avLst>
-            <a:gd name="adj" fmla="val 10000"/>
-          </a:avLst>
-        </a:prstGeom>
-        <a:solidFill>
-          <a:schemeClr val="lt1">
-            <a:alpha val="90000"/>
-            <a:hueOff val="0"/>
-            <a:satOff val="0"/>
-            <a:lumOff val="0"/>
-            <a:alphaOff val="0"/>
-          </a:schemeClr>
-        </a:solidFill>
-        <a:ln w="25400" cap="flat" cmpd="sng" algn="ctr">
-          <a:solidFill>
-            <a:schemeClr val="accent1">
-              <a:hueOff val="0"/>
-              <a:satOff val="0"/>
-              <a:lumOff val="0"/>
-              <a:alphaOff val="0"/>
-            </a:schemeClr>
-          </a:solidFill>
-          <a:prstDash val="solid"/>
-        </a:ln>
-        <a:effectLst/>
-      </dsp:spPr>
-      <dsp:style>
-        <a:lnRef idx="2">
-          <a:scrgbClr r="0" g="0" b="0"/>
-        </a:lnRef>
-        <a:fillRef idx="1">
-          <a:scrgbClr r="0" g="0" b="0"/>
-        </a:fillRef>
-        <a:effectRef idx="0">
-          <a:scrgbClr r="0" g="0" b="0"/>
-        </a:effectRef>
-        <a:fontRef idx="minor"/>
-      </dsp:style>
-      <dsp:txBody>
-        <a:bodyPr spcFirstLastPara="0" vert="horz" wrap="square" lIns="53340" tIns="53340" rIns="53340" bIns="53340" numCol="1" spcCol="1270" anchor="t" anchorCtr="0">
-          <a:noAutofit/>
-        </a:bodyPr>
-        <a:lstStyle/>
-        <a:p>
-          <a:pPr marL="285750" lvl="1" indent="-285750" algn="l" defTabSz="1244600">
-            <a:lnSpc>
-              <a:spcPct val="90000"/>
-            </a:lnSpc>
-            <a:spcBef>
-              <a:spcPct val="0"/>
-            </a:spcBef>
-            <a:spcAft>
-              <a:spcPct val="15000"/>
-            </a:spcAft>
-            <a:buChar char="••"/>
-          </a:pPr>
-          <a:r>
-            <a:rPr lang="en-US" sz="2800" kern="1200" dirty="0" smtClean="0"/>
-            <a:t>Send profile</a:t>
-          </a:r>
-          <a:endParaRPr lang="en-US" sz="2800" kern="1200" dirty="0"/>
-        </a:p>
-      </dsp:txBody>
-      <dsp:txXfrm>
-        <a:off x="2805121" y="1770170"/>
-        <a:ext cx="2225975" cy="1442543"/>
-      </dsp:txXfrm>
-    </dsp:sp>
-    <dsp:sp modelId="{7D8BF6BB-FE5B-40FC-AD81-AEEFE9939CDB}">
-      <dsp:nvSpPr>
-        <dsp:cNvPr id="0" name=""/>
-        <dsp:cNvSpPr/>
-      </dsp:nvSpPr>
-      <dsp:spPr>
-        <a:xfrm>
-          <a:off x="4049237" y="268719"/>
-          <a:ext cx="2677055" cy="2677055"/>
-        </a:xfrm>
-        <a:prstGeom prst="circularArrow">
-          <a:avLst>
-            <a:gd name="adj1" fmla="val 2588"/>
-            <a:gd name="adj2" fmla="val 314348"/>
-            <a:gd name="adj3" fmla="val 19510141"/>
-            <a:gd name="adj4" fmla="val 12575511"/>
-            <a:gd name="adj5" fmla="val 3020"/>
-          </a:avLst>
-        </a:prstGeom>
-        <a:solidFill>
-          <a:schemeClr val="accent1">
-            <a:tint val="60000"/>
-            <a:hueOff val="0"/>
-            <a:satOff val="0"/>
-            <a:lumOff val="0"/>
-            <a:alphaOff val="0"/>
-          </a:schemeClr>
-        </a:solidFill>
-        <a:ln>
-          <a:noFill/>
-        </a:ln>
-        <a:effectLst/>
-      </dsp:spPr>
-      <dsp:style>
-        <a:lnRef idx="0">
-          <a:scrgbClr r="0" g="0" b="0"/>
-        </a:lnRef>
-        <a:fillRef idx="1">
-          <a:scrgbClr r="0" g="0" b="0"/>
-        </a:fillRef>
-        <a:effectRef idx="0">
-          <a:scrgbClr r="0" g="0" b="0"/>
-        </a:effectRef>
-        <a:fontRef idx="minor">
-          <a:schemeClr val="lt1"/>
-        </a:fontRef>
-      </dsp:style>
-    </dsp:sp>
-    <dsp:sp modelId="{50BCD8B4-8C61-4CDE-A56B-06D0CA4C4B58}">
-      <dsp:nvSpPr>
-        <dsp:cNvPr id="0" name=""/>
-        <dsp:cNvSpPr/>
-      </dsp:nvSpPr>
-      <dsp:spPr>
-        <a:xfrm>
-          <a:off x="3299783" y="983328"/>
-          <a:ext cx="1978645" cy="786841"/>
-        </a:xfrm>
-        <a:prstGeom prst="roundRect">
-          <a:avLst>
-            <a:gd name="adj" fmla="val 10000"/>
-          </a:avLst>
-        </a:prstGeom>
-        <a:solidFill>
-          <a:schemeClr val="accent1">
-            <a:hueOff val="0"/>
-            <a:satOff val="0"/>
-            <a:lumOff val="0"/>
-            <a:alphaOff val="0"/>
-          </a:schemeClr>
-        </a:solidFill>
-        <a:ln w="25400" cap="flat" cmpd="sng" algn="ctr">
-          <a:solidFill>
-            <a:schemeClr val="lt1">
-              <a:hueOff val="0"/>
-              <a:satOff val="0"/>
-              <a:lumOff val="0"/>
-              <a:alphaOff val="0"/>
-            </a:schemeClr>
-          </a:solidFill>
-          <a:prstDash val="solid"/>
-        </a:ln>
-        <a:effectLst/>
-      </dsp:spPr>
-      <dsp:style>
-        <a:lnRef idx="2">
-          <a:scrgbClr r="0" g="0" b="0"/>
-        </a:lnRef>
-        <a:fillRef idx="1">
-          <a:scrgbClr r="0" g="0" b="0"/>
-        </a:fillRef>
-        <a:effectRef idx="0">
-          <a:scrgbClr r="0" g="0" b="0"/>
-        </a:effectRef>
-        <a:fontRef idx="minor">
-          <a:schemeClr val="lt1"/>
-        </a:fontRef>
-      </dsp:style>
-      <dsp:txBody>
-        <a:bodyPr spcFirstLastPara="0" vert="horz" wrap="square" lIns="64770" tIns="43180" rIns="64770" bIns="43180" numCol="1" spcCol="1270" anchor="ctr" anchorCtr="0">
-          <a:noAutofit/>
-        </a:bodyPr>
-        <a:lstStyle/>
-        <a:p>
-          <a:pPr lvl="0" algn="ctr" defTabSz="1511300">
-            <a:lnSpc>
-              <a:spcPct val="90000"/>
-            </a:lnSpc>
-            <a:spcBef>
-              <a:spcPct val="0"/>
-            </a:spcBef>
-            <a:spcAft>
-              <a:spcPct val="35000"/>
-            </a:spcAft>
-          </a:pPr>
-          <a:r>
-            <a:rPr lang="en-US" sz="3400" kern="1200" dirty="0" smtClean="0"/>
-            <a:t>Service</a:t>
-          </a:r>
-          <a:endParaRPr lang="en-US" sz="3400" kern="1200" dirty="0"/>
-        </a:p>
-      </dsp:txBody>
-      <dsp:txXfrm>
-        <a:off x="3299783" y="983328"/>
-        <a:ext cx="1978645" cy="786841"/>
-      </dsp:txXfrm>
-    </dsp:sp>
-    <dsp:sp modelId="{64FF0BBC-8AD4-4FCD-846E-B56658E731E0}">
-      <dsp:nvSpPr>
-        <dsp:cNvPr id="0" name=""/>
-        <dsp:cNvSpPr/>
-      </dsp:nvSpPr>
-      <dsp:spPr>
-        <a:xfrm>
-          <a:off x="5608401" y="1376749"/>
-          <a:ext cx="2225975" cy="1835964"/>
-        </a:xfrm>
-        <a:prstGeom prst="roundRect">
-          <a:avLst>
-            <a:gd name="adj" fmla="val 10000"/>
-          </a:avLst>
-        </a:prstGeom>
-        <a:solidFill>
-          <a:schemeClr val="lt1">
-            <a:alpha val="90000"/>
-            <a:hueOff val="0"/>
-            <a:satOff val="0"/>
-            <a:lumOff val="0"/>
-            <a:alphaOff val="0"/>
-          </a:schemeClr>
-        </a:solidFill>
-        <a:ln w="25400" cap="flat" cmpd="sng" algn="ctr">
-          <a:solidFill>
-            <a:schemeClr val="accent1">
-              <a:hueOff val="0"/>
-              <a:satOff val="0"/>
-              <a:lumOff val="0"/>
-              <a:alphaOff val="0"/>
-            </a:schemeClr>
-          </a:solidFill>
-          <a:prstDash val="solid"/>
-        </a:ln>
-        <a:effectLst/>
-      </dsp:spPr>
-      <dsp:style>
-        <a:lnRef idx="2">
-          <a:scrgbClr r="0" g="0" b="0"/>
-        </a:lnRef>
-        <a:fillRef idx="1">
-          <a:scrgbClr r="0" g="0" b="0"/>
-        </a:fillRef>
-        <a:effectRef idx="0">
-          <a:scrgbClr r="0" g="0" b="0"/>
-        </a:effectRef>
-        <a:fontRef idx="minor"/>
-      </dsp:style>
-      <dsp:txBody>
-        <a:bodyPr spcFirstLastPara="0" vert="horz" wrap="square" lIns="53340" tIns="53340" rIns="53340" bIns="53340" numCol="1" spcCol="1270" anchor="t" anchorCtr="0">
-          <a:noAutofit/>
-        </a:bodyPr>
-        <a:lstStyle/>
-        <a:p>
-          <a:pPr marL="285750" lvl="1" indent="-285750" algn="l" defTabSz="1244600">
-            <a:lnSpc>
-              <a:spcPct val="90000"/>
-            </a:lnSpc>
-            <a:spcBef>
-              <a:spcPct val="0"/>
-            </a:spcBef>
-            <a:spcAft>
-              <a:spcPct val="15000"/>
-            </a:spcAft>
-            <a:buChar char="••"/>
-          </a:pPr>
-          <a:r>
-            <a:rPr lang="en-US" sz="2800" kern="1200" dirty="0" smtClean="0"/>
-            <a:t>Find URL for creating FTP request</a:t>
-          </a:r>
-          <a:endParaRPr lang="en-US" sz="2800" kern="1200" dirty="0"/>
-        </a:p>
-      </dsp:txBody>
-      <dsp:txXfrm>
-        <a:off x="5608401" y="1376749"/>
-        <a:ext cx="2225975" cy="1442543"/>
-      </dsp:txXfrm>
-    </dsp:sp>
-    <dsp:sp modelId="{17874885-AEE6-4AAD-A50E-85D17F2D7ADF}">
-      <dsp:nvSpPr>
-        <dsp:cNvPr id="0" name=""/>
-        <dsp:cNvSpPr/>
-      </dsp:nvSpPr>
-      <dsp:spPr>
-        <a:xfrm>
-          <a:off x="6103062" y="2819292"/>
-          <a:ext cx="1978645" cy="786841"/>
-        </a:xfrm>
-        <a:prstGeom prst="roundRect">
-          <a:avLst>
-            <a:gd name="adj" fmla="val 10000"/>
-          </a:avLst>
-        </a:prstGeom>
-        <a:solidFill>
-          <a:schemeClr val="accent1">
-            <a:hueOff val="0"/>
-            <a:satOff val="0"/>
-            <a:lumOff val="0"/>
-            <a:alphaOff val="0"/>
-          </a:schemeClr>
-        </a:solidFill>
-        <a:ln w="25400" cap="flat" cmpd="sng" algn="ctr">
-          <a:solidFill>
-            <a:schemeClr val="lt1">
-              <a:hueOff val="0"/>
-              <a:satOff val="0"/>
-              <a:lumOff val="0"/>
-              <a:alphaOff val="0"/>
-            </a:schemeClr>
-          </a:solidFill>
-          <a:prstDash val="solid"/>
-        </a:ln>
-        <a:effectLst/>
-      </dsp:spPr>
-      <dsp:style>
-        <a:lnRef idx="2">
-          <a:scrgbClr r="0" g="0" b="0"/>
-        </a:lnRef>
-        <a:fillRef idx="1">
-          <a:scrgbClr r="0" g="0" b="0"/>
-        </a:fillRef>
-        <a:effectRef idx="0">
-          <a:scrgbClr r="0" g="0" b="0"/>
-        </a:effectRef>
-        <a:fontRef idx="minor">
-          <a:schemeClr val="lt1"/>
-        </a:fontRef>
-      </dsp:style>
-      <dsp:txBody>
-        <a:bodyPr spcFirstLastPara="0" vert="horz" wrap="square" lIns="64770" tIns="43180" rIns="64770" bIns="43180" numCol="1" spcCol="1270" anchor="ctr" anchorCtr="0">
-          <a:noAutofit/>
-        </a:bodyPr>
-        <a:lstStyle/>
-        <a:p>
-          <a:pPr lvl="0" algn="ctr" defTabSz="1511300">
-            <a:lnSpc>
-              <a:spcPct val="90000"/>
-            </a:lnSpc>
-            <a:spcBef>
-              <a:spcPct val="0"/>
-            </a:spcBef>
-            <a:spcAft>
-              <a:spcPct val="35000"/>
-            </a:spcAft>
-          </a:pPr>
-          <a:r>
-            <a:rPr lang="en-US" sz="3400" kern="1200" dirty="0" smtClean="0"/>
-            <a:t>Consumer</a:t>
-          </a:r>
-          <a:endParaRPr lang="en-US" sz="3400" kern="1200" dirty="0"/>
-        </a:p>
-      </dsp:txBody>
-      <dsp:txXfrm>
-        <a:off x="6103062" y="2819292"/>
-        <a:ext cx="1978645" cy="786841"/>
-      </dsp:txXfrm>
-    </dsp:sp>
   </dsp:spTree>
 </dsp:drawing>
 </file>
@@ -4737,614 +4167,6 @@
       <dsp:cNvGrpSpPr/>
     </dsp:nvGrpSpPr>
     <dsp:grpSpPr/>
-    <dsp:sp modelId="{6EE815F1-6D64-4196-8401-9C0B24CE7363}">
-      <dsp:nvSpPr>
-        <dsp:cNvPr id="0" name=""/>
-        <dsp:cNvSpPr/>
-      </dsp:nvSpPr>
-      <dsp:spPr>
-        <a:xfrm>
-          <a:off x="1842" y="1376749"/>
-          <a:ext cx="2225975" cy="1835964"/>
-        </a:xfrm>
-        <a:prstGeom prst="roundRect">
-          <a:avLst>
-            <a:gd name="adj" fmla="val 10000"/>
-          </a:avLst>
-        </a:prstGeom>
-        <a:solidFill>
-          <a:schemeClr val="lt1">
-            <a:alpha val="90000"/>
-            <a:hueOff val="0"/>
-            <a:satOff val="0"/>
-            <a:lumOff val="0"/>
-            <a:alphaOff val="0"/>
-          </a:schemeClr>
-        </a:solidFill>
-        <a:ln w="25400" cap="flat" cmpd="sng" algn="ctr">
-          <a:solidFill>
-            <a:schemeClr val="accent1">
-              <a:hueOff val="0"/>
-              <a:satOff val="0"/>
-              <a:lumOff val="0"/>
-              <a:alphaOff val="0"/>
-            </a:schemeClr>
-          </a:solidFill>
-          <a:prstDash val="solid"/>
-        </a:ln>
-        <a:effectLst/>
-      </dsp:spPr>
-      <dsp:style>
-        <a:lnRef idx="2">
-          <a:scrgbClr r="0" g="0" b="0"/>
-        </a:lnRef>
-        <a:fillRef idx="1">
-          <a:scrgbClr r="0" g="0" b="0"/>
-        </a:fillRef>
-        <a:effectRef idx="0">
-          <a:scrgbClr r="0" g="0" b="0"/>
-        </a:effectRef>
-        <a:fontRef idx="minor"/>
-      </dsp:style>
-      <dsp:txBody>
-        <a:bodyPr spcFirstLastPara="0" vert="horz" wrap="square" lIns="32385" tIns="32385" rIns="32385" bIns="32385" numCol="1" spcCol="1270" anchor="t" anchorCtr="0">
-          <a:noAutofit/>
-        </a:bodyPr>
-        <a:lstStyle/>
-        <a:p>
-          <a:pPr marL="171450" lvl="1" indent="-171450" algn="l" defTabSz="755650">
-            <a:lnSpc>
-              <a:spcPct val="90000"/>
-            </a:lnSpc>
-            <a:spcBef>
-              <a:spcPct val="0"/>
-            </a:spcBef>
-            <a:spcAft>
-              <a:spcPct val="15000"/>
-            </a:spcAft>
-            <a:buChar char="••"/>
-          </a:pPr>
-          <a:r>
-            <a:rPr lang="en-US" sz="1700" kern="1200" dirty="0" smtClean="0"/>
-            <a:t>Create Request</a:t>
-          </a:r>
-          <a:endParaRPr lang="en-US" sz="1700" kern="1200" dirty="0"/>
-        </a:p>
-      </dsp:txBody>
-      <dsp:txXfrm>
-        <a:off x="1842" y="1376749"/>
-        <a:ext cx="2225975" cy="1442543"/>
-      </dsp:txXfrm>
-    </dsp:sp>
-    <dsp:sp modelId="{72BD51F2-6274-491B-8B03-E816D3636284}">
-      <dsp:nvSpPr>
-        <dsp:cNvPr id="0" name=""/>
-        <dsp:cNvSpPr/>
-      </dsp:nvSpPr>
-      <dsp:spPr>
-        <a:xfrm>
-          <a:off x="1264508" y="1856131"/>
-          <a:ext cx="2392624" cy="2392624"/>
-        </a:xfrm>
-        <a:prstGeom prst="leftCircularArrow">
-          <a:avLst>
-            <a:gd name="adj1" fmla="val 2896"/>
-            <a:gd name="adj2" fmla="val 354252"/>
-            <a:gd name="adj3" fmla="val 2129763"/>
-            <a:gd name="adj4" fmla="val 9024489"/>
-            <a:gd name="adj5" fmla="val 3379"/>
-          </a:avLst>
-        </a:prstGeom>
-        <a:solidFill>
-          <a:schemeClr val="accent1">
-            <a:tint val="60000"/>
-            <a:hueOff val="0"/>
-            <a:satOff val="0"/>
-            <a:lumOff val="0"/>
-            <a:alphaOff val="0"/>
-          </a:schemeClr>
-        </a:solidFill>
-        <a:ln>
-          <a:noFill/>
-        </a:ln>
-        <a:effectLst/>
-      </dsp:spPr>
-      <dsp:style>
-        <a:lnRef idx="0">
-          <a:scrgbClr r="0" g="0" b="0"/>
-        </a:lnRef>
-        <a:fillRef idx="1">
-          <a:scrgbClr r="0" g="0" b="0"/>
-        </a:fillRef>
-        <a:effectRef idx="0">
-          <a:scrgbClr r="0" g="0" b="0"/>
-        </a:effectRef>
-        <a:fontRef idx="minor">
-          <a:schemeClr val="lt1"/>
-        </a:fontRef>
-      </dsp:style>
-    </dsp:sp>
-    <dsp:sp modelId="{69EE502B-58DE-44AF-ABA0-822DBC342A54}">
-      <dsp:nvSpPr>
-        <dsp:cNvPr id="0" name=""/>
-        <dsp:cNvSpPr/>
-      </dsp:nvSpPr>
-      <dsp:spPr>
-        <a:xfrm>
-          <a:off x="496503" y="2819292"/>
-          <a:ext cx="1978645" cy="786841"/>
-        </a:xfrm>
-        <a:prstGeom prst="roundRect">
-          <a:avLst>
-            <a:gd name="adj" fmla="val 10000"/>
-          </a:avLst>
-        </a:prstGeom>
-        <a:solidFill>
-          <a:schemeClr val="accent1">
-            <a:hueOff val="0"/>
-            <a:satOff val="0"/>
-            <a:lumOff val="0"/>
-            <a:alphaOff val="0"/>
-          </a:schemeClr>
-        </a:solidFill>
-        <a:ln w="25400" cap="flat" cmpd="sng" algn="ctr">
-          <a:solidFill>
-            <a:schemeClr val="lt1">
-              <a:hueOff val="0"/>
-              <a:satOff val="0"/>
-              <a:lumOff val="0"/>
-              <a:alphaOff val="0"/>
-            </a:schemeClr>
-          </a:solidFill>
-          <a:prstDash val="solid"/>
-        </a:ln>
-        <a:effectLst/>
-      </dsp:spPr>
-      <dsp:style>
-        <a:lnRef idx="2">
-          <a:scrgbClr r="0" g="0" b="0"/>
-        </a:lnRef>
-        <a:fillRef idx="1">
-          <a:scrgbClr r="0" g="0" b="0"/>
-        </a:fillRef>
-        <a:effectRef idx="0">
-          <a:scrgbClr r="0" g="0" b="0"/>
-        </a:effectRef>
-        <a:fontRef idx="minor">
-          <a:schemeClr val="lt1"/>
-        </a:fontRef>
-      </dsp:style>
-      <dsp:txBody>
-        <a:bodyPr spcFirstLastPara="0" vert="horz" wrap="square" lIns="64770" tIns="43180" rIns="64770" bIns="43180" numCol="1" spcCol="1270" anchor="ctr" anchorCtr="0">
-          <a:noAutofit/>
-        </a:bodyPr>
-        <a:lstStyle/>
-        <a:p>
-          <a:pPr lvl="0" algn="ctr" defTabSz="1511300">
-            <a:lnSpc>
-              <a:spcPct val="90000"/>
-            </a:lnSpc>
-            <a:spcBef>
-              <a:spcPct val="0"/>
-            </a:spcBef>
-            <a:spcAft>
-              <a:spcPct val="35000"/>
-            </a:spcAft>
-          </a:pPr>
-          <a:r>
-            <a:rPr lang="en-US" sz="3400" kern="1200" dirty="0" smtClean="0"/>
-            <a:t>Consumer</a:t>
-          </a:r>
-          <a:endParaRPr lang="en-US" sz="3400" kern="1200" dirty="0"/>
-        </a:p>
-      </dsp:txBody>
-      <dsp:txXfrm>
-        <a:off x="496503" y="2819292"/>
-        <a:ext cx="1978645" cy="786841"/>
-      </dsp:txXfrm>
-    </dsp:sp>
-    <dsp:sp modelId="{5ED24A8C-48F7-42F7-9663-FD09B3C9E1F1}">
-      <dsp:nvSpPr>
-        <dsp:cNvPr id="0" name=""/>
-        <dsp:cNvSpPr/>
-      </dsp:nvSpPr>
-      <dsp:spPr>
-        <a:xfrm>
-          <a:off x="2805121" y="1376749"/>
-          <a:ext cx="2225975" cy="1835964"/>
-        </a:xfrm>
-        <a:prstGeom prst="roundRect">
-          <a:avLst>
-            <a:gd name="adj" fmla="val 10000"/>
-          </a:avLst>
-        </a:prstGeom>
-        <a:solidFill>
-          <a:schemeClr val="lt1">
-            <a:alpha val="90000"/>
-            <a:hueOff val="0"/>
-            <a:satOff val="0"/>
-            <a:lumOff val="0"/>
-            <a:alphaOff val="0"/>
-          </a:schemeClr>
-        </a:solidFill>
-        <a:ln w="25400" cap="flat" cmpd="sng" algn="ctr">
-          <a:solidFill>
-            <a:schemeClr val="accent1">
-              <a:hueOff val="0"/>
-              <a:satOff val="0"/>
-              <a:lumOff val="0"/>
-              <a:alphaOff val="0"/>
-            </a:schemeClr>
-          </a:solidFill>
-          <a:prstDash val="solid"/>
-        </a:ln>
-        <a:effectLst/>
-      </dsp:spPr>
-      <dsp:style>
-        <a:lnRef idx="2">
-          <a:scrgbClr r="0" g="0" b="0"/>
-        </a:lnRef>
-        <a:fillRef idx="1">
-          <a:scrgbClr r="0" g="0" b="0"/>
-        </a:fillRef>
-        <a:effectRef idx="0">
-          <a:scrgbClr r="0" g="0" b="0"/>
-        </a:effectRef>
-        <a:fontRef idx="minor"/>
-      </dsp:style>
-      <dsp:txBody>
-        <a:bodyPr spcFirstLastPara="0" vert="horz" wrap="square" lIns="32385" tIns="32385" rIns="32385" bIns="32385" numCol="1" spcCol="1270" anchor="t" anchorCtr="0">
-          <a:noAutofit/>
-        </a:bodyPr>
-        <a:lstStyle/>
-        <a:p>
-          <a:pPr marL="171450" lvl="1" indent="-171450" algn="l" defTabSz="755650">
-            <a:lnSpc>
-              <a:spcPct val="90000"/>
-            </a:lnSpc>
-            <a:spcBef>
-              <a:spcPct val="0"/>
-            </a:spcBef>
-            <a:spcAft>
-              <a:spcPct val="15000"/>
-            </a:spcAft>
-            <a:buChar char="••"/>
-          </a:pPr>
-          <a:r>
-            <a:rPr lang="en-US" sz="1700" kern="1200" dirty="0" smtClean="0"/>
-            <a:t>Create Unique ID</a:t>
-          </a:r>
-          <a:endParaRPr lang="en-US" sz="1700" kern="1200" dirty="0"/>
-        </a:p>
-        <a:p>
-          <a:pPr marL="171450" lvl="1" indent="-171450" algn="l" defTabSz="755650">
-            <a:lnSpc>
-              <a:spcPct val="90000"/>
-            </a:lnSpc>
-            <a:spcBef>
-              <a:spcPct val="0"/>
-            </a:spcBef>
-            <a:spcAft>
-              <a:spcPct val="15000"/>
-            </a:spcAft>
-            <a:buChar char="••"/>
-          </a:pPr>
-          <a:r>
-            <a:rPr lang="en-US" sz="1700" kern="1200" dirty="0" smtClean="0"/>
-            <a:t>Send command message to actor</a:t>
-          </a:r>
-          <a:endParaRPr lang="en-US" sz="1700" kern="1200" dirty="0"/>
-        </a:p>
-        <a:p>
-          <a:pPr marL="171450" lvl="1" indent="-171450" algn="l" defTabSz="755650">
-            <a:lnSpc>
-              <a:spcPct val="90000"/>
-            </a:lnSpc>
-            <a:spcBef>
-              <a:spcPct val="0"/>
-            </a:spcBef>
-            <a:spcAft>
-              <a:spcPct val="15000"/>
-            </a:spcAft>
-            <a:buChar char="••"/>
-          </a:pPr>
-          <a:r>
-            <a:rPr lang="en-US" sz="1700" kern="1200" dirty="0" smtClean="0"/>
-            <a:t>Send reply with Polling URL</a:t>
-          </a:r>
-          <a:endParaRPr lang="en-US" sz="1700" kern="1200" dirty="0"/>
-        </a:p>
-      </dsp:txBody>
-      <dsp:txXfrm>
-        <a:off x="2805121" y="1770170"/>
-        <a:ext cx="2225975" cy="1442543"/>
-      </dsp:txXfrm>
-    </dsp:sp>
-    <dsp:sp modelId="{7D8BF6BB-FE5B-40FC-AD81-AEEFE9939CDB}">
-      <dsp:nvSpPr>
-        <dsp:cNvPr id="0" name=""/>
-        <dsp:cNvSpPr/>
-      </dsp:nvSpPr>
-      <dsp:spPr>
-        <a:xfrm>
-          <a:off x="4049237" y="268719"/>
-          <a:ext cx="2677055" cy="2677055"/>
-        </a:xfrm>
-        <a:prstGeom prst="circularArrow">
-          <a:avLst>
-            <a:gd name="adj1" fmla="val 2588"/>
-            <a:gd name="adj2" fmla="val 314348"/>
-            <a:gd name="adj3" fmla="val 19510141"/>
-            <a:gd name="adj4" fmla="val 12575511"/>
-            <a:gd name="adj5" fmla="val 3020"/>
-          </a:avLst>
-        </a:prstGeom>
-        <a:solidFill>
-          <a:schemeClr val="accent1">
-            <a:tint val="60000"/>
-            <a:hueOff val="0"/>
-            <a:satOff val="0"/>
-            <a:lumOff val="0"/>
-            <a:alphaOff val="0"/>
-          </a:schemeClr>
-        </a:solidFill>
-        <a:ln>
-          <a:noFill/>
-        </a:ln>
-        <a:effectLst/>
-      </dsp:spPr>
-      <dsp:style>
-        <a:lnRef idx="0">
-          <a:scrgbClr r="0" g="0" b="0"/>
-        </a:lnRef>
-        <a:fillRef idx="1">
-          <a:scrgbClr r="0" g="0" b="0"/>
-        </a:fillRef>
-        <a:effectRef idx="0">
-          <a:scrgbClr r="0" g="0" b="0"/>
-        </a:effectRef>
-        <a:fontRef idx="minor">
-          <a:schemeClr val="lt1"/>
-        </a:fontRef>
-      </dsp:style>
-    </dsp:sp>
-    <dsp:sp modelId="{50BCD8B4-8C61-4CDE-A56B-06D0CA4C4B58}">
-      <dsp:nvSpPr>
-        <dsp:cNvPr id="0" name=""/>
-        <dsp:cNvSpPr/>
-      </dsp:nvSpPr>
-      <dsp:spPr>
-        <a:xfrm>
-          <a:off x="3299783" y="983328"/>
-          <a:ext cx="1978645" cy="786841"/>
-        </a:xfrm>
-        <a:prstGeom prst="roundRect">
-          <a:avLst>
-            <a:gd name="adj" fmla="val 10000"/>
-          </a:avLst>
-        </a:prstGeom>
-        <a:solidFill>
-          <a:schemeClr val="accent1">
-            <a:hueOff val="0"/>
-            <a:satOff val="0"/>
-            <a:lumOff val="0"/>
-            <a:alphaOff val="0"/>
-          </a:schemeClr>
-        </a:solidFill>
-        <a:ln w="25400" cap="flat" cmpd="sng" algn="ctr">
-          <a:solidFill>
-            <a:schemeClr val="lt1">
-              <a:hueOff val="0"/>
-              <a:satOff val="0"/>
-              <a:lumOff val="0"/>
-              <a:alphaOff val="0"/>
-            </a:schemeClr>
-          </a:solidFill>
-          <a:prstDash val="solid"/>
-        </a:ln>
-        <a:effectLst/>
-      </dsp:spPr>
-      <dsp:style>
-        <a:lnRef idx="2">
-          <a:scrgbClr r="0" g="0" b="0"/>
-        </a:lnRef>
-        <a:fillRef idx="1">
-          <a:scrgbClr r="0" g="0" b="0"/>
-        </a:fillRef>
-        <a:effectRef idx="0">
-          <a:scrgbClr r="0" g="0" b="0"/>
-        </a:effectRef>
-        <a:fontRef idx="minor">
-          <a:schemeClr val="lt1"/>
-        </a:fontRef>
-      </dsp:style>
-      <dsp:txBody>
-        <a:bodyPr spcFirstLastPara="0" vert="horz" wrap="square" lIns="64770" tIns="43180" rIns="64770" bIns="43180" numCol="1" spcCol="1270" anchor="ctr" anchorCtr="0">
-          <a:noAutofit/>
-        </a:bodyPr>
-        <a:lstStyle/>
-        <a:p>
-          <a:pPr lvl="0" algn="ctr" defTabSz="1511300">
-            <a:lnSpc>
-              <a:spcPct val="90000"/>
-            </a:lnSpc>
-            <a:spcBef>
-              <a:spcPct val="0"/>
-            </a:spcBef>
-            <a:spcAft>
-              <a:spcPct val="35000"/>
-            </a:spcAft>
-          </a:pPr>
-          <a:r>
-            <a:rPr lang="en-US" sz="3400" kern="1200" dirty="0" smtClean="0"/>
-            <a:t>Service</a:t>
-          </a:r>
-          <a:endParaRPr lang="en-US" sz="3400" kern="1200" dirty="0"/>
-        </a:p>
-      </dsp:txBody>
-      <dsp:txXfrm>
-        <a:off x="3299783" y="983328"/>
-        <a:ext cx="1978645" cy="786841"/>
-      </dsp:txXfrm>
-    </dsp:sp>
-    <dsp:sp modelId="{64FF0BBC-8AD4-4FCD-846E-B56658E731E0}">
-      <dsp:nvSpPr>
-        <dsp:cNvPr id="0" name=""/>
-        <dsp:cNvSpPr/>
-      </dsp:nvSpPr>
-      <dsp:spPr>
-        <a:xfrm>
-          <a:off x="5608401" y="1376749"/>
-          <a:ext cx="2225975" cy="1835964"/>
-        </a:xfrm>
-        <a:prstGeom prst="roundRect">
-          <a:avLst>
-            <a:gd name="adj" fmla="val 10000"/>
-          </a:avLst>
-        </a:prstGeom>
-        <a:solidFill>
-          <a:schemeClr val="lt1">
-            <a:alpha val="90000"/>
-            <a:hueOff val="0"/>
-            <a:satOff val="0"/>
-            <a:lumOff val="0"/>
-            <a:alphaOff val="0"/>
-          </a:schemeClr>
-        </a:solidFill>
-        <a:ln w="25400" cap="flat" cmpd="sng" algn="ctr">
-          <a:solidFill>
-            <a:schemeClr val="accent1">
-              <a:hueOff val="0"/>
-              <a:satOff val="0"/>
-              <a:lumOff val="0"/>
-              <a:alphaOff val="0"/>
-            </a:schemeClr>
-          </a:solidFill>
-          <a:prstDash val="solid"/>
-        </a:ln>
-        <a:effectLst/>
-      </dsp:spPr>
-      <dsp:style>
-        <a:lnRef idx="2">
-          <a:scrgbClr r="0" g="0" b="0"/>
-        </a:lnRef>
-        <a:fillRef idx="1">
-          <a:scrgbClr r="0" g="0" b="0"/>
-        </a:fillRef>
-        <a:effectRef idx="0">
-          <a:scrgbClr r="0" g="0" b="0"/>
-        </a:effectRef>
-        <a:fontRef idx="minor"/>
-      </dsp:style>
-      <dsp:txBody>
-        <a:bodyPr spcFirstLastPara="0" vert="horz" wrap="square" lIns="32385" tIns="32385" rIns="32385" bIns="32385" numCol="1" spcCol="1270" anchor="t" anchorCtr="0">
-          <a:noAutofit/>
-        </a:bodyPr>
-        <a:lstStyle/>
-        <a:p>
-          <a:pPr marL="171450" lvl="1" indent="-171450" algn="l" defTabSz="755650">
-            <a:lnSpc>
-              <a:spcPct val="90000"/>
-            </a:lnSpc>
-            <a:spcBef>
-              <a:spcPct val="0"/>
-            </a:spcBef>
-            <a:spcAft>
-              <a:spcPct val="15000"/>
-            </a:spcAft>
-            <a:buChar char="••"/>
-          </a:pPr>
-          <a:r>
-            <a:rPr lang="en-US" sz="1700" kern="1200" dirty="0" smtClean="0"/>
-            <a:t>Poll for status</a:t>
-          </a:r>
-          <a:endParaRPr lang="en-US" sz="1700" kern="1200" dirty="0"/>
-        </a:p>
-      </dsp:txBody>
-      <dsp:txXfrm>
-        <a:off x="5608401" y="1376749"/>
-        <a:ext cx="2225975" cy="1442543"/>
-      </dsp:txXfrm>
-    </dsp:sp>
-    <dsp:sp modelId="{17874885-AEE6-4AAD-A50E-85D17F2D7ADF}">
-      <dsp:nvSpPr>
-        <dsp:cNvPr id="0" name=""/>
-        <dsp:cNvSpPr/>
-      </dsp:nvSpPr>
-      <dsp:spPr>
-        <a:xfrm>
-          <a:off x="6103062" y="2819292"/>
-          <a:ext cx="1978645" cy="786841"/>
-        </a:xfrm>
-        <a:prstGeom prst="roundRect">
-          <a:avLst>
-            <a:gd name="adj" fmla="val 10000"/>
-          </a:avLst>
-        </a:prstGeom>
-        <a:solidFill>
-          <a:schemeClr val="accent1">
-            <a:hueOff val="0"/>
-            <a:satOff val="0"/>
-            <a:lumOff val="0"/>
-            <a:alphaOff val="0"/>
-          </a:schemeClr>
-        </a:solidFill>
-        <a:ln w="25400" cap="flat" cmpd="sng" algn="ctr">
-          <a:solidFill>
-            <a:schemeClr val="lt1">
-              <a:hueOff val="0"/>
-              <a:satOff val="0"/>
-              <a:lumOff val="0"/>
-              <a:alphaOff val="0"/>
-            </a:schemeClr>
-          </a:solidFill>
-          <a:prstDash val="solid"/>
-        </a:ln>
-        <a:effectLst/>
-      </dsp:spPr>
-      <dsp:style>
-        <a:lnRef idx="2">
-          <a:scrgbClr r="0" g="0" b="0"/>
-        </a:lnRef>
-        <a:fillRef idx="1">
-          <a:scrgbClr r="0" g="0" b="0"/>
-        </a:fillRef>
-        <a:effectRef idx="0">
-          <a:scrgbClr r="0" g="0" b="0"/>
-        </a:effectRef>
-        <a:fontRef idx="minor">
-          <a:schemeClr val="lt1"/>
-        </a:fontRef>
-      </dsp:style>
-      <dsp:txBody>
-        <a:bodyPr spcFirstLastPara="0" vert="horz" wrap="square" lIns="64770" tIns="43180" rIns="64770" bIns="43180" numCol="1" spcCol="1270" anchor="ctr" anchorCtr="0">
-          <a:noAutofit/>
-        </a:bodyPr>
-        <a:lstStyle/>
-        <a:p>
-          <a:pPr lvl="0" algn="ctr" defTabSz="1511300">
-            <a:lnSpc>
-              <a:spcPct val="90000"/>
-            </a:lnSpc>
-            <a:spcBef>
-              <a:spcPct val="0"/>
-            </a:spcBef>
-            <a:spcAft>
-              <a:spcPct val="35000"/>
-            </a:spcAft>
-          </a:pPr>
-          <a:r>
-            <a:rPr lang="en-US" sz="3400" kern="1200" dirty="0" smtClean="0"/>
-            <a:t>Consumer</a:t>
-          </a:r>
-          <a:endParaRPr lang="en-US" sz="3400" kern="1200" dirty="0"/>
-        </a:p>
-      </dsp:txBody>
-      <dsp:txXfrm>
-        <a:off x="6103062" y="2819292"/>
-        <a:ext cx="1978645" cy="786841"/>
-      </dsp:txXfrm>
-    </dsp:sp>
   </dsp:spTree>
 </dsp:drawing>
 </file>
@@ -5357,633 +4179,6 @@
       <dsp:cNvGrpSpPr/>
     </dsp:nvGrpSpPr>
     <dsp:grpSpPr/>
-    <dsp:sp modelId="{6EE815F1-6D64-4196-8401-9C0B24CE7363}">
-      <dsp:nvSpPr>
-        <dsp:cNvPr id="0" name=""/>
-        <dsp:cNvSpPr/>
-      </dsp:nvSpPr>
-      <dsp:spPr>
-        <a:xfrm>
-          <a:off x="1842" y="1376749"/>
-          <a:ext cx="2225975" cy="1835964"/>
-        </a:xfrm>
-        <a:prstGeom prst="roundRect">
-          <a:avLst>
-            <a:gd name="adj" fmla="val 10000"/>
-          </a:avLst>
-        </a:prstGeom>
-        <a:solidFill>
-          <a:schemeClr val="lt1">
-            <a:alpha val="90000"/>
-            <a:hueOff val="0"/>
-            <a:satOff val="0"/>
-            <a:lumOff val="0"/>
-            <a:alphaOff val="0"/>
-          </a:schemeClr>
-        </a:solidFill>
-        <a:ln w="25400" cap="flat" cmpd="sng" algn="ctr">
-          <a:solidFill>
-            <a:schemeClr val="accent1">
-              <a:hueOff val="0"/>
-              <a:satOff val="0"/>
-              <a:lumOff val="0"/>
-              <a:alphaOff val="0"/>
-            </a:schemeClr>
-          </a:solidFill>
-          <a:prstDash val="solid"/>
-        </a:ln>
-        <a:effectLst/>
-      </dsp:spPr>
-      <dsp:style>
-        <a:lnRef idx="2">
-          <a:scrgbClr r="0" g="0" b="0"/>
-        </a:lnRef>
-        <a:fillRef idx="1">
-          <a:scrgbClr r="0" g="0" b="0"/>
-        </a:fillRef>
-        <a:effectRef idx="0">
-          <a:scrgbClr r="0" g="0" b="0"/>
-        </a:effectRef>
-        <a:fontRef idx="minor"/>
-      </dsp:style>
-      <dsp:txBody>
-        <a:bodyPr spcFirstLastPara="0" vert="horz" wrap="square" lIns="34290" tIns="34290" rIns="34290" bIns="34290" numCol="1" spcCol="1270" anchor="t" anchorCtr="0">
-          <a:noAutofit/>
-        </a:bodyPr>
-        <a:lstStyle/>
-        <a:p>
-          <a:pPr marL="171450" lvl="1" indent="-171450" algn="l" defTabSz="800100">
-            <a:lnSpc>
-              <a:spcPct val="90000"/>
-            </a:lnSpc>
-            <a:spcBef>
-              <a:spcPct val="0"/>
-            </a:spcBef>
-            <a:spcAft>
-              <a:spcPct val="15000"/>
-            </a:spcAft>
-            <a:buChar char="••"/>
-          </a:pPr>
-          <a:r>
-            <a:rPr lang="en-US" sz="1800" kern="1200" dirty="0" smtClean="0"/>
-            <a:t>Create message with response URL</a:t>
-          </a:r>
-          <a:endParaRPr lang="en-US" sz="1800" kern="1200" dirty="0"/>
-        </a:p>
-      </dsp:txBody>
-      <dsp:txXfrm>
-        <a:off x="1842" y="1376749"/>
-        <a:ext cx="2225975" cy="1442543"/>
-      </dsp:txXfrm>
-    </dsp:sp>
-    <dsp:sp modelId="{72BD51F2-6274-491B-8B03-E816D3636284}">
-      <dsp:nvSpPr>
-        <dsp:cNvPr id="0" name=""/>
-        <dsp:cNvSpPr/>
-      </dsp:nvSpPr>
-      <dsp:spPr>
-        <a:xfrm>
-          <a:off x="1264508" y="1856131"/>
-          <a:ext cx="2392624" cy="2392624"/>
-        </a:xfrm>
-        <a:prstGeom prst="leftCircularArrow">
-          <a:avLst>
-            <a:gd name="adj1" fmla="val 2896"/>
-            <a:gd name="adj2" fmla="val 354252"/>
-            <a:gd name="adj3" fmla="val 2129763"/>
-            <a:gd name="adj4" fmla="val 9024489"/>
-            <a:gd name="adj5" fmla="val 3379"/>
-          </a:avLst>
-        </a:prstGeom>
-        <a:solidFill>
-          <a:schemeClr val="accent1">
-            <a:tint val="60000"/>
-            <a:hueOff val="0"/>
-            <a:satOff val="0"/>
-            <a:lumOff val="0"/>
-            <a:alphaOff val="0"/>
-          </a:schemeClr>
-        </a:solidFill>
-        <a:ln>
-          <a:noFill/>
-        </a:ln>
-        <a:effectLst/>
-      </dsp:spPr>
-      <dsp:style>
-        <a:lnRef idx="0">
-          <a:scrgbClr r="0" g="0" b="0"/>
-        </a:lnRef>
-        <a:fillRef idx="1">
-          <a:scrgbClr r="0" g="0" b="0"/>
-        </a:fillRef>
-        <a:effectRef idx="0">
-          <a:scrgbClr r="0" g="0" b="0"/>
-        </a:effectRef>
-        <a:fontRef idx="minor">
-          <a:schemeClr val="lt1"/>
-        </a:fontRef>
-      </dsp:style>
-    </dsp:sp>
-    <dsp:sp modelId="{69EE502B-58DE-44AF-ABA0-822DBC342A54}">
-      <dsp:nvSpPr>
-        <dsp:cNvPr id="0" name=""/>
-        <dsp:cNvSpPr/>
-      </dsp:nvSpPr>
-      <dsp:spPr>
-        <a:xfrm>
-          <a:off x="496503" y="2819292"/>
-          <a:ext cx="1978645" cy="786841"/>
-        </a:xfrm>
-        <a:prstGeom prst="roundRect">
-          <a:avLst>
-            <a:gd name="adj" fmla="val 10000"/>
-          </a:avLst>
-        </a:prstGeom>
-        <a:solidFill>
-          <a:schemeClr val="accent1">
-            <a:hueOff val="0"/>
-            <a:satOff val="0"/>
-            <a:lumOff val="0"/>
-            <a:alphaOff val="0"/>
-          </a:schemeClr>
-        </a:solidFill>
-        <a:ln w="25400" cap="flat" cmpd="sng" algn="ctr">
-          <a:solidFill>
-            <a:schemeClr val="lt1">
-              <a:hueOff val="0"/>
-              <a:satOff val="0"/>
-              <a:lumOff val="0"/>
-              <a:alphaOff val="0"/>
-            </a:schemeClr>
-          </a:solidFill>
-          <a:prstDash val="solid"/>
-        </a:ln>
-        <a:effectLst/>
-      </dsp:spPr>
-      <dsp:style>
-        <a:lnRef idx="2">
-          <a:scrgbClr r="0" g="0" b="0"/>
-        </a:lnRef>
-        <a:fillRef idx="1">
-          <a:scrgbClr r="0" g="0" b="0"/>
-        </a:fillRef>
-        <a:effectRef idx="0">
-          <a:scrgbClr r="0" g="0" b="0"/>
-        </a:effectRef>
-        <a:fontRef idx="minor">
-          <a:schemeClr val="lt1"/>
-        </a:fontRef>
-      </dsp:style>
-      <dsp:txBody>
-        <a:bodyPr spcFirstLastPara="0" vert="horz" wrap="square" lIns="83820" tIns="55880" rIns="83820" bIns="55880" numCol="1" spcCol="1270" anchor="ctr" anchorCtr="0">
-          <a:noAutofit/>
-        </a:bodyPr>
-        <a:lstStyle/>
-        <a:p>
-          <a:pPr lvl="0" algn="ctr" defTabSz="1955800">
-            <a:lnSpc>
-              <a:spcPct val="90000"/>
-            </a:lnSpc>
-            <a:spcBef>
-              <a:spcPct val="0"/>
-            </a:spcBef>
-            <a:spcAft>
-              <a:spcPct val="35000"/>
-            </a:spcAft>
-          </a:pPr>
-          <a:r>
-            <a:rPr lang="en-US" sz="4400" kern="1200" dirty="0" smtClean="0"/>
-            <a:t>Service</a:t>
-          </a:r>
-          <a:endParaRPr lang="en-US" sz="4400" kern="1200" dirty="0"/>
-        </a:p>
-      </dsp:txBody>
-      <dsp:txXfrm>
-        <a:off x="496503" y="2819292"/>
-        <a:ext cx="1978645" cy="786841"/>
-      </dsp:txXfrm>
-    </dsp:sp>
-    <dsp:sp modelId="{5ED24A8C-48F7-42F7-9663-FD09B3C9E1F1}">
-      <dsp:nvSpPr>
-        <dsp:cNvPr id="0" name=""/>
-        <dsp:cNvSpPr/>
-      </dsp:nvSpPr>
-      <dsp:spPr>
-        <a:xfrm>
-          <a:off x="2805121" y="1376749"/>
-          <a:ext cx="2225975" cy="1835964"/>
-        </a:xfrm>
-        <a:prstGeom prst="roundRect">
-          <a:avLst>
-            <a:gd name="adj" fmla="val 10000"/>
-          </a:avLst>
-        </a:prstGeom>
-        <a:solidFill>
-          <a:schemeClr val="lt1">
-            <a:alpha val="90000"/>
-            <a:hueOff val="0"/>
-            <a:satOff val="0"/>
-            <a:lumOff val="0"/>
-            <a:alphaOff val="0"/>
-          </a:schemeClr>
-        </a:solidFill>
-        <a:ln w="25400" cap="flat" cmpd="sng" algn="ctr">
-          <a:solidFill>
-            <a:schemeClr val="accent1">
-              <a:hueOff val="0"/>
-              <a:satOff val="0"/>
-              <a:lumOff val="0"/>
-              <a:alphaOff val="0"/>
-            </a:schemeClr>
-          </a:solidFill>
-          <a:prstDash val="solid"/>
-        </a:ln>
-        <a:effectLst/>
-      </dsp:spPr>
-      <dsp:style>
-        <a:lnRef idx="2">
-          <a:scrgbClr r="0" g="0" b="0"/>
-        </a:lnRef>
-        <a:fillRef idx="1">
-          <a:scrgbClr r="0" g="0" b="0"/>
-        </a:fillRef>
-        <a:effectRef idx="0">
-          <a:scrgbClr r="0" g="0" b="0"/>
-        </a:effectRef>
-        <a:fontRef idx="minor"/>
-      </dsp:style>
-      <dsp:txBody>
-        <a:bodyPr spcFirstLastPara="0" vert="horz" wrap="square" lIns="34290" tIns="34290" rIns="34290" bIns="34290" numCol="1" spcCol="1270" anchor="t" anchorCtr="0">
-          <a:noAutofit/>
-        </a:bodyPr>
-        <a:lstStyle/>
-        <a:p>
-          <a:pPr marL="171450" lvl="1" indent="-171450" algn="l" defTabSz="800100">
-            <a:lnSpc>
-              <a:spcPct val="90000"/>
-            </a:lnSpc>
-            <a:spcBef>
-              <a:spcPct val="0"/>
-            </a:spcBef>
-            <a:spcAft>
-              <a:spcPct val="15000"/>
-            </a:spcAft>
-            <a:buChar char="••"/>
-          </a:pPr>
-          <a:r>
-            <a:rPr lang="en-US" sz="1800" kern="1200" dirty="0" smtClean="0"/>
-            <a:t>Retrieve file through FTP</a:t>
-          </a:r>
-          <a:endParaRPr lang="en-US" sz="1800" kern="1200" dirty="0"/>
-        </a:p>
-        <a:p>
-          <a:pPr marL="171450" lvl="1" indent="-171450" algn="l" defTabSz="800100">
-            <a:lnSpc>
-              <a:spcPct val="90000"/>
-            </a:lnSpc>
-            <a:spcBef>
-              <a:spcPct val="0"/>
-            </a:spcBef>
-            <a:spcAft>
-              <a:spcPct val="15000"/>
-            </a:spcAft>
-            <a:buChar char="••"/>
-          </a:pPr>
-          <a:r>
-            <a:rPr lang="en-US" sz="1800" kern="1200" dirty="0" smtClean="0"/>
-            <a:t>Send data to URL</a:t>
-          </a:r>
-          <a:endParaRPr lang="en-US" sz="1800" kern="1200" dirty="0"/>
-        </a:p>
-      </dsp:txBody>
-      <dsp:txXfrm>
-        <a:off x="2805121" y="1770170"/>
-        <a:ext cx="2225975" cy="1442543"/>
-      </dsp:txXfrm>
-    </dsp:sp>
-    <dsp:sp modelId="{7D8BF6BB-FE5B-40FC-AD81-AEEFE9939CDB}">
-      <dsp:nvSpPr>
-        <dsp:cNvPr id="0" name=""/>
-        <dsp:cNvSpPr/>
-      </dsp:nvSpPr>
-      <dsp:spPr>
-        <a:xfrm>
-          <a:off x="4049237" y="268719"/>
-          <a:ext cx="2677055" cy="2677055"/>
-        </a:xfrm>
-        <a:prstGeom prst="circularArrow">
-          <a:avLst>
-            <a:gd name="adj1" fmla="val 2588"/>
-            <a:gd name="adj2" fmla="val 314348"/>
-            <a:gd name="adj3" fmla="val 19510141"/>
-            <a:gd name="adj4" fmla="val 12575511"/>
-            <a:gd name="adj5" fmla="val 3020"/>
-          </a:avLst>
-        </a:prstGeom>
-        <a:solidFill>
-          <a:schemeClr val="accent1">
-            <a:tint val="60000"/>
-            <a:hueOff val="0"/>
-            <a:satOff val="0"/>
-            <a:lumOff val="0"/>
-            <a:alphaOff val="0"/>
-          </a:schemeClr>
-        </a:solidFill>
-        <a:ln>
-          <a:noFill/>
-        </a:ln>
-        <a:effectLst/>
-      </dsp:spPr>
-      <dsp:style>
-        <a:lnRef idx="0">
-          <a:scrgbClr r="0" g="0" b="0"/>
-        </a:lnRef>
-        <a:fillRef idx="1">
-          <a:scrgbClr r="0" g="0" b="0"/>
-        </a:fillRef>
-        <a:effectRef idx="0">
-          <a:scrgbClr r="0" g="0" b="0"/>
-        </a:effectRef>
-        <a:fontRef idx="minor">
-          <a:schemeClr val="lt1"/>
-        </a:fontRef>
-      </dsp:style>
-    </dsp:sp>
-    <dsp:sp modelId="{50BCD8B4-8C61-4CDE-A56B-06D0CA4C4B58}">
-      <dsp:nvSpPr>
-        <dsp:cNvPr id="0" name=""/>
-        <dsp:cNvSpPr/>
-      </dsp:nvSpPr>
-      <dsp:spPr>
-        <a:xfrm>
-          <a:off x="3299783" y="983328"/>
-          <a:ext cx="1978645" cy="786841"/>
-        </a:xfrm>
-        <a:prstGeom prst="roundRect">
-          <a:avLst>
-            <a:gd name="adj" fmla="val 10000"/>
-          </a:avLst>
-        </a:prstGeom>
-        <a:solidFill>
-          <a:schemeClr val="accent1">
-            <a:hueOff val="0"/>
-            <a:satOff val="0"/>
-            <a:lumOff val="0"/>
-            <a:alphaOff val="0"/>
-          </a:schemeClr>
-        </a:solidFill>
-        <a:ln w="25400" cap="flat" cmpd="sng" algn="ctr">
-          <a:solidFill>
-            <a:schemeClr val="lt1">
-              <a:hueOff val="0"/>
-              <a:satOff val="0"/>
-              <a:lumOff val="0"/>
-              <a:alphaOff val="0"/>
-            </a:schemeClr>
-          </a:solidFill>
-          <a:prstDash val="solid"/>
-        </a:ln>
-        <a:effectLst/>
-      </dsp:spPr>
-      <dsp:style>
-        <a:lnRef idx="2">
-          <a:scrgbClr r="0" g="0" b="0"/>
-        </a:lnRef>
-        <a:fillRef idx="1">
-          <a:scrgbClr r="0" g="0" b="0"/>
-        </a:fillRef>
-        <a:effectRef idx="0">
-          <a:scrgbClr r="0" g="0" b="0"/>
-        </a:effectRef>
-        <a:fontRef idx="minor">
-          <a:schemeClr val="lt1"/>
-        </a:fontRef>
-      </dsp:style>
-      <dsp:txBody>
-        <a:bodyPr spcFirstLastPara="0" vert="horz" wrap="square" lIns="83820" tIns="55880" rIns="83820" bIns="55880" numCol="1" spcCol="1270" anchor="ctr" anchorCtr="0">
-          <a:noAutofit/>
-        </a:bodyPr>
-        <a:lstStyle/>
-        <a:p>
-          <a:pPr lvl="0" algn="ctr" defTabSz="1955800">
-            <a:lnSpc>
-              <a:spcPct val="90000"/>
-            </a:lnSpc>
-            <a:spcBef>
-              <a:spcPct val="0"/>
-            </a:spcBef>
-            <a:spcAft>
-              <a:spcPct val="35000"/>
-            </a:spcAft>
-          </a:pPr>
-          <a:r>
-            <a:rPr lang="en-US" sz="4400" kern="1200" dirty="0" smtClean="0"/>
-            <a:t>Actor</a:t>
-          </a:r>
-          <a:endParaRPr lang="en-US" sz="4400" kern="1200" dirty="0"/>
-        </a:p>
-      </dsp:txBody>
-      <dsp:txXfrm>
-        <a:off x="3299783" y="983328"/>
-        <a:ext cx="1978645" cy="786841"/>
-      </dsp:txXfrm>
-    </dsp:sp>
-    <dsp:sp modelId="{64FF0BBC-8AD4-4FCD-846E-B56658E731E0}">
-      <dsp:nvSpPr>
-        <dsp:cNvPr id="0" name=""/>
-        <dsp:cNvSpPr/>
-      </dsp:nvSpPr>
-      <dsp:spPr>
-        <a:xfrm>
-          <a:off x="5608401" y="1376749"/>
-          <a:ext cx="2225975" cy="1835964"/>
-        </a:xfrm>
-        <a:prstGeom prst="roundRect">
-          <a:avLst>
-            <a:gd name="adj" fmla="val 10000"/>
-          </a:avLst>
-        </a:prstGeom>
-        <a:solidFill>
-          <a:schemeClr val="lt1">
-            <a:alpha val="90000"/>
-            <a:hueOff val="0"/>
-            <a:satOff val="0"/>
-            <a:lumOff val="0"/>
-            <a:alphaOff val="0"/>
-          </a:schemeClr>
-        </a:solidFill>
-        <a:ln w="25400" cap="flat" cmpd="sng" algn="ctr">
-          <a:solidFill>
-            <a:schemeClr val="accent1">
-              <a:hueOff val="0"/>
-              <a:satOff val="0"/>
-              <a:lumOff val="0"/>
-              <a:alphaOff val="0"/>
-            </a:schemeClr>
-          </a:solidFill>
-          <a:prstDash val="solid"/>
-        </a:ln>
-        <a:effectLst/>
-      </dsp:spPr>
-      <dsp:style>
-        <a:lnRef idx="2">
-          <a:scrgbClr r="0" g="0" b="0"/>
-        </a:lnRef>
-        <a:fillRef idx="1">
-          <a:scrgbClr r="0" g="0" b="0"/>
-        </a:fillRef>
-        <a:effectRef idx="0">
-          <a:scrgbClr r="0" g="0" b="0"/>
-        </a:effectRef>
-        <a:fontRef idx="minor"/>
-      </dsp:style>
-      <dsp:txBody>
-        <a:bodyPr spcFirstLastPara="0" vert="horz" wrap="square" lIns="34290" tIns="34290" rIns="34290" bIns="34290" numCol="1" spcCol="1270" anchor="t" anchorCtr="0">
-          <a:noAutofit/>
-        </a:bodyPr>
-        <a:lstStyle/>
-        <a:p>
-          <a:pPr marL="171450" lvl="1" indent="-171450" algn="l" defTabSz="800100">
-            <a:lnSpc>
-              <a:spcPct val="90000"/>
-            </a:lnSpc>
-            <a:spcBef>
-              <a:spcPct val="0"/>
-            </a:spcBef>
-            <a:spcAft>
-              <a:spcPct val="15000"/>
-            </a:spcAft>
-            <a:buChar char="••"/>
-          </a:pPr>
-          <a:r>
-            <a:rPr lang="en-US" sz="1800" kern="1200" dirty="0" smtClean="0"/>
-            <a:t>Update resource</a:t>
-          </a:r>
-          <a:endParaRPr lang="en-US" sz="1800" kern="1200" dirty="0"/>
-        </a:p>
-        <a:p>
-          <a:pPr marL="171450" lvl="1" indent="-171450" algn="l" defTabSz="800100">
-            <a:lnSpc>
-              <a:spcPct val="90000"/>
-            </a:lnSpc>
-            <a:spcBef>
-              <a:spcPct val="0"/>
-            </a:spcBef>
-            <a:spcAft>
-              <a:spcPct val="15000"/>
-            </a:spcAft>
-            <a:buChar char="••"/>
-          </a:pPr>
-          <a:r>
-            <a:rPr lang="en-US" sz="1800" kern="1200" dirty="0" smtClean="0"/>
-            <a:t>Send event message</a:t>
-          </a:r>
-          <a:endParaRPr lang="en-US" sz="1800" kern="1200" dirty="0"/>
-        </a:p>
-        <a:p>
-          <a:pPr marL="171450" lvl="1" indent="-171450" algn="l" defTabSz="800100">
-            <a:lnSpc>
-              <a:spcPct val="90000"/>
-            </a:lnSpc>
-            <a:spcBef>
-              <a:spcPct val="0"/>
-            </a:spcBef>
-            <a:spcAft>
-              <a:spcPct val="15000"/>
-            </a:spcAft>
-            <a:buChar char="••"/>
-          </a:pPr>
-          <a:r>
-            <a:rPr lang="en-US" sz="1800" kern="1200" dirty="0" smtClean="0"/>
-            <a:t>Reply with URL for new resource</a:t>
-          </a:r>
-          <a:endParaRPr lang="en-US" sz="1800" kern="1200" dirty="0"/>
-        </a:p>
-      </dsp:txBody>
-      <dsp:txXfrm>
-        <a:off x="5608401" y="1376749"/>
-        <a:ext cx="2225975" cy="1442543"/>
-      </dsp:txXfrm>
-    </dsp:sp>
-    <dsp:sp modelId="{17874885-AEE6-4AAD-A50E-85D17F2D7ADF}">
-      <dsp:nvSpPr>
-        <dsp:cNvPr id="0" name=""/>
-        <dsp:cNvSpPr/>
-      </dsp:nvSpPr>
-      <dsp:spPr>
-        <a:xfrm>
-          <a:off x="6103062" y="2819292"/>
-          <a:ext cx="1978645" cy="786841"/>
-        </a:xfrm>
-        <a:prstGeom prst="roundRect">
-          <a:avLst>
-            <a:gd name="adj" fmla="val 10000"/>
-          </a:avLst>
-        </a:prstGeom>
-        <a:solidFill>
-          <a:schemeClr val="accent1">
-            <a:hueOff val="0"/>
-            <a:satOff val="0"/>
-            <a:lumOff val="0"/>
-            <a:alphaOff val="0"/>
-          </a:schemeClr>
-        </a:solidFill>
-        <a:ln w="25400" cap="flat" cmpd="sng" algn="ctr">
-          <a:solidFill>
-            <a:schemeClr val="lt1">
-              <a:hueOff val="0"/>
-              <a:satOff val="0"/>
-              <a:lumOff val="0"/>
-              <a:alphaOff val="0"/>
-            </a:schemeClr>
-          </a:solidFill>
-          <a:prstDash val="solid"/>
-        </a:ln>
-        <a:effectLst/>
-      </dsp:spPr>
-      <dsp:style>
-        <a:lnRef idx="2">
-          <a:scrgbClr r="0" g="0" b="0"/>
-        </a:lnRef>
-        <a:fillRef idx="1">
-          <a:scrgbClr r="0" g="0" b="0"/>
-        </a:fillRef>
-        <a:effectRef idx="0">
-          <a:scrgbClr r="0" g="0" b="0"/>
-        </a:effectRef>
-        <a:fontRef idx="minor">
-          <a:schemeClr val="lt1"/>
-        </a:fontRef>
-      </dsp:style>
-      <dsp:txBody>
-        <a:bodyPr spcFirstLastPara="0" vert="horz" wrap="square" lIns="83820" tIns="55880" rIns="83820" bIns="55880" numCol="1" spcCol="1270" anchor="ctr" anchorCtr="0">
-          <a:noAutofit/>
-        </a:bodyPr>
-        <a:lstStyle/>
-        <a:p>
-          <a:pPr lvl="0" algn="ctr" defTabSz="1955800">
-            <a:lnSpc>
-              <a:spcPct val="90000"/>
-            </a:lnSpc>
-            <a:spcBef>
-              <a:spcPct val="0"/>
-            </a:spcBef>
-            <a:spcAft>
-              <a:spcPct val="35000"/>
-            </a:spcAft>
-          </a:pPr>
-          <a:r>
-            <a:rPr lang="en-US" sz="4400" kern="1200" dirty="0" smtClean="0"/>
-            <a:t>Service</a:t>
-          </a:r>
-          <a:endParaRPr lang="en-US" sz="4400" kern="1200" dirty="0"/>
-        </a:p>
-      </dsp:txBody>
-      <dsp:txXfrm>
-        <a:off x="6103062" y="2819292"/>
-        <a:ext cx="1978645" cy="786841"/>
-      </dsp:txXfrm>
-    </dsp:sp>
   </dsp:spTree>
 </dsp:drawing>
 </file>
@@ -11505,23 +9700,7 @@
           <a:p>
             <a:r>
               <a:rPr lang="en-US" baseline="0" dirty="0" smtClean="0"/>
-              <a:t>[Marco] I started with the bank as a software architect about a year ago. It wasn’t long until THE question was asked: what is THE architecture. As anyone would, I tried to side step that question by asking what the system or product was that we were trying to find an architecture for. The answer was simple: EVERYTHING. What is THE architecture for everything we do. </a:t>
-            </a:r>
-            <a:r>
-              <a:rPr lang="en-US" baseline="0" dirty="0" smtClean="0"/>
-              <a:t>This </a:t>
-            </a:r>
-            <a:r>
-              <a:rPr lang="en-US" baseline="0" dirty="0" smtClean="0"/>
-              <a:t>question kept popping </a:t>
-            </a:r>
-            <a:r>
-              <a:rPr lang="en-US" baseline="0" dirty="0" smtClean="0"/>
-              <a:t>up in subsequent meetings. </a:t>
-            </a:r>
-            <a:r>
-              <a:rPr lang="en-US" baseline="0" dirty="0" smtClean="0"/>
-              <a:t>So I started thinking about what the underlying architecture is for everything we are trying to accomplish. And the following is what I came up with.</a:t>
+              <a:t>[Marco] I started with the bank as a software architect about a year ago. It wasn’t long until THE question was asked: what is THE architecture. As anyone would, I tried to side step that question by asking what the system or product was that we were trying to find an architecture for. The answer was simple: EVERYTHING. What is THE architecture for everything we do. This question kept popping up in subsequent meetings. So I started thinking about what the underlying architecture is for everything we are trying to accomplish. And the following is what I came up with.</a:t>
             </a:r>
             <a:endParaRPr lang="en-US" dirty="0" smtClean="0"/>
           </a:p>
@@ -12047,13 +10226,8 @@
             <a:pPr rtl="0"/>
             <a:r>
               <a:rPr lang="en-US" dirty="0" smtClean="0"/>
-              <a:t>The use of a platform strategy provides several benefits</a:t>
-            </a:r>
-            <a:r>
-              <a:rPr lang="en-US" dirty="0" smtClean="0"/>
-              <a:t>:</a:t>
-            </a:r>
-            <a:endParaRPr lang="en-US" dirty="0" smtClean="0"/>
+              <a:t>The use of a platform strategy provides several benefits:</a:t>
+            </a:r>
           </a:p>
           <a:p>
             <a:pPr rtl="0"/>
@@ -12066,11 +10240,7 @@
             </a:pPr>
             <a:r>
               <a:rPr lang="en-US" dirty="0" smtClean="0"/>
-              <a:t>Greater flexibility between plants (the possibility of transferring production from one plant to another due to standardization</a:t>
-            </a:r>
-            <a:r>
-              <a:rPr lang="en-US" dirty="0" smtClean="0"/>
-              <a:t>),</a:t>
+              <a:t>Greater flexibility between plants (the possibility of transferring production from one plant to another due to standardization),</a:t>
             </a:r>
           </a:p>
           <a:p>
@@ -12080,15 +10250,7 @@
             </a:pPr>
             <a:r>
               <a:rPr lang="en-US" dirty="0" smtClean="0"/>
-              <a:t>Cost </a:t>
-            </a:r>
-            <a:r>
-              <a:rPr lang="en-US" dirty="0" smtClean="0"/>
-              <a:t>reduction achieved through using resources on a global </a:t>
-            </a:r>
-            <a:r>
-              <a:rPr lang="en-US" dirty="0" smtClean="0"/>
-              <a:t>scale,</a:t>
+              <a:t>Cost reduction achieved through using resources on a global scale,</a:t>
             </a:r>
           </a:p>
           <a:p>
@@ -12098,15 +10260,7 @@
             </a:pPr>
             <a:r>
               <a:rPr lang="en-US" dirty="0" smtClean="0"/>
-              <a:t>Increased </a:t>
-            </a:r>
-            <a:r>
-              <a:rPr lang="en-US" dirty="0" smtClean="0"/>
-              <a:t>use of plants (higher productivity due to the reduction in the number of differences), </a:t>
-            </a:r>
-            <a:r>
-              <a:rPr lang="en-US" dirty="0" smtClean="0"/>
-              <a:t>and</a:t>
+              <a:t>Increased use of plants (higher productivity due to the reduction in the number of differences), and</a:t>
             </a:r>
           </a:p>
           <a:p>
@@ -12116,11 +10270,7 @@
             </a:pPr>
             <a:r>
               <a:rPr lang="en-US" dirty="0" smtClean="0"/>
-              <a:t>Reduction </a:t>
-            </a:r>
-            <a:r>
-              <a:rPr lang="en-US" dirty="0" smtClean="0"/>
-              <a:t>of the number of platforms as a result of their localization on a worldwide basis.</a:t>
+              <a:t>Reduction of the number of platforms as a result of their localization on a worldwide basis.</a:t>
             </a:r>
           </a:p>
           <a:p>
@@ -12131,37 +10281,8 @@
             <a:pPr rtl="0"/>
             <a:r>
               <a:rPr lang="en-US" dirty="0" smtClean="0"/>
-              <a:t>The automobile platform strategy has become important in new product development and in the innovation </a:t>
-            </a:r>
-            <a:r>
-              <a:rPr lang="en-US" dirty="0" smtClean="0"/>
-              <a:t>process. The </a:t>
-            </a:r>
-            <a:r>
-              <a:rPr lang="en-US" dirty="0" smtClean="0"/>
-              <a:t>finished products have to be responsive to market needs and to demonstrate distinctiveness while — at the same time — they must be developed and produced at low cost</a:t>
-            </a:r>
-            <a:r>
-              <a:rPr lang="en-US" dirty="0" smtClean="0"/>
-              <a:t>. </a:t>
-            </a:r>
-            <a:r>
-              <a:rPr lang="en-US" dirty="0" smtClean="0"/>
-              <a:t>Adopting such a strategy affects the development process and also has an important impact on an automaker's organizational structure</a:t>
-            </a:r>
-            <a:r>
-              <a:rPr lang="en-US" dirty="0" smtClean="0"/>
-              <a:t>. </a:t>
-            </a:r>
-            <a:r>
-              <a:rPr lang="en-US" dirty="0" smtClean="0"/>
-              <a:t>A platform strategy also offers advantages for the globalization process of automobile firms</a:t>
-            </a:r>
-            <a:r>
-              <a:rPr lang="en-US" dirty="0" smtClean="0"/>
-              <a:t>.</a:t>
-            </a:r>
-            <a:endParaRPr lang="en-US" dirty="0" smtClean="0"/>
+              <a:t>The automobile platform strategy has become important in new product development and in the innovation process. The finished products have to be responsive to market needs and to demonstrate distinctiveness while — at the same time — they must be developed and produced at low cost. Adopting such a strategy affects the development process and also has an important impact on an automaker's organizational structure. A platform strategy also offers advantages for the globalization process of automobile firms.</a:t>
+            </a:r>
           </a:p>
           <a:p>
             <a:endParaRPr lang="en-US" dirty="0"/>
@@ -12688,15 +10809,7 @@
           <a:p>
             <a:r>
               <a:rPr lang="en-US" dirty="0" smtClean="0"/>
-              <a:t>A well executed platform strategy is one of the key drivers behind the success of one of the </a:t>
-            </a:r>
-            <a:r>
-              <a:rPr lang="en-US" dirty="0" smtClean="0"/>
-              <a:t>world’s </a:t>
-            </a:r>
-            <a:r>
-              <a:rPr lang="en-US" dirty="0" smtClean="0"/>
-              <a:t>largest car </a:t>
+              <a:t>A well executed platform strategy is one of the key drivers behind the success of one of the world’s largest car </a:t>
             </a:r>
             <a:r>
               <a:rPr lang="en-US" dirty="0" err="1" smtClean="0"/>
@@ -12704,11 +10817,7 @@
             </a:r>
             <a:r>
               <a:rPr lang="en-US" dirty="0" smtClean="0"/>
-              <a:t>: </a:t>
-            </a:r>
-            <a:r>
-              <a:rPr lang="en-US" dirty="0" smtClean="0"/>
-              <a:t>Volkswagen.</a:t>
+              <a:t>: Volkswagen.</a:t>
             </a:r>
           </a:p>
           <a:p>
@@ -13756,15 +11865,7 @@
             </a:r>
             <a:r>
               <a:rPr lang="en-US" baseline="0" dirty="0" smtClean="0"/>
-              <a:t> definite signs of service oriented architecture when I started at the bank. They made heavy use of a message bus for integration and there were some web services. However, there were challenges: many of the integrations seemed brittle, cumbersome and messaging did not seem to work well. It was </a:t>
-            </a:r>
-            <a:r>
-              <a:rPr lang="en-US" baseline="0" dirty="0" smtClean="0"/>
-              <a:t>perceived </a:t>
-            </a:r>
-            <a:r>
-              <a:rPr lang="en-US" baseline="0" dirty="0" smtClean="0"/>
-              <a:t>as slow and difficult to maintain.</a:t>
+              <a:t> definite signs of service oriented architecture when I started at the bank. They made heavy use of a message bus for integration and there were some web services. However, there were challenges: many of the integrations seemed brittle, cumbersome and messaging did not seem to work well. It was perceived as slow and difficult to maintain.</a:t>
             </a:r>
           </a:p>
           <a:p>
@@ -13794,23 +11895,7 @@
             </a:r>
             <a:r>
               <a:rPr lang="en-US" baseline="0" dirty="0" smtClean="0"/>
-              <a:t> Oriented Platform. Lets break down how we got there. We will first look at what </a:t>
-            </a:r>
-            <a:r>
-              <a:rPr lang="en-US" baseline="0" dirty="0" smtClean="0"/>
-              <a:t>it means to be an </a:t>
-            </a:r>
-            <a:r>
-              <a:rPr lang="en-US" baseline="0" dirty="0" smtClean="0"/>
-              <a:t>evolvable service oriented </a:t>
-            </a:r>
-            <a:r>
-              <a:rPr lang="en-US" baseline="0" dirty="0" smtClean="0"/>
-              <a:t>platform. </a:t>
-            </a:r>
-            <a:r>
-              <a:rPr lang="en-US" baseline="0" dirty="0" smtClean="0"/>
-              <a:t>Secondly we will look for a suitable technology stack to implement the architecture with. Finally we will give a practical example.</a:t>
+              <a:t> Oriented Platform. Lets break down how we got there. We will first look at what it means to be an evolvable service oriented platform. Secondly we will look for a suitable technology stack to implement the architecture with. Finally we will give a practical example.</a:t>
             </a:r>
           </a:p>
           <a:p>
@@ -14001,11 +12086,7 @@
             </a:r>
             <a:r>
               <a:rPr lang="en-US" baseline="0" dirty="0" smtClean="0"/>
-              <a:t> doors? An example from our environment: we have a system write to a table in a database. The system sends out a message. The system that receives the message then also writes to the same table, assuming that the previous write has taken place. This turned out to be rather disastrous design once change came along. Although the systems appear to be loosely coupled through a message, they are actually very tightly coupled at database level</a:t>
-            </a:r>
-            <a:r>
-              <a:rPr lang="en-US" baseline="0" dirty="0" smtClean="0"/>
-              <a:t>.</a:t>
+              <a:t> doors? An example from our environment: we have a system write to a table in a database. The system sends out a message. The system that receives the message then also writes to the same table, assuming that the previous write has taken place. This turned out to be rather disastrous design once change came along. Although the systems appear to be loosely coupled through a message, they are actually very tightly coupled at database level.</a:t>
             </a:r>
           </a:p>
           <a:p>
@@ -14016,7 +12097,6 @@
               <a:rPr lang="en-US" baseline="0" dirty="0" smtClean="0"/>
               <a:t>Another example from our environment: a message is received and data is stored in the database. Later on, a stored procedure is used to copy data from this table to another system.</a:t>
             </a:r>
-            <a:endParaRPr lang="en-US" baseline="0" dirty="0" smtClean="0"/>
           </a:p>
           <a:p>
             <a:endParaRPr lang="en-US" baseline="0" dirty="0" smtClean="0"/>
@@ -14119,11 +12199,7 @@
             </a:r>
             <a:r>
               <a:rPr lang="en-US" baseline="0" dirty="0" smtClean="0"/>
-              <a:t> recap of what an evolvable service oriented platform is</a:t>
-            </a:r>
-            <a:r>
-              <a:rPr lang="en-US" baseline="0" dirty="0" smtClean="0"/>
-              <a:t>. Not only will a service oriented platform adapt to change, it will drive change. </a:t>
+              <a:t> recap of what an evolvable service oriented platform is. Not only will a service oriented platform adapt to change, it will drive change. </a:t>
             </a:r>
           </a:p>
           <a:p>
@@ -14832,7 +12908,23 @@
             </a:r>
             <a:r>
               <a:rPr lang="en-US" baseline="0" dirty="0" smtClean="0"/>
-              <a:t> coupling between concepts that are not strongly coupled to start with. For example: the relationship between an order and its shipping address us much looser than the relationship between an order and the order details. If you include the order and shipping address in a single resource, you created a coupling that will potential limit the changes you can make to the system over time.</a:t>
+              <a:t> coupling between concepts that are not strongly coupled to start with. For example: the relationship between an order and its shipping address </a:t>
+            </a:r>
+            <a:r>
+              <a:rPr lang="en-US" baseline="0" dirty="0" smtClean="0"/>
+              <a:t>is </a:t>
+            </a:r>
+            <a:r>
+              <a:rPr lang="en-US" baseline="0" dirty="0" smtClean="0"/>
+              <a:t>much looser than the relationship between an order and the order details. If you include the order and shipping address in a single resource, you created a coupling that will </a:t>
+            </a:r>
+            <a:r>
+              <a:rPr lang="en-US" baseline="0" dirty="0" smtClean="0"/>
+              <a:t>limit </a:t>
+            </a:r>
+            <a:r>
+              <a:rPr lang="en-US" baseline="0" dirty="0" smtClean="0"/>
+              <a:t>the changes you can make to the system over time.</a:t>
             </a:r>
             <a:endParaRPr lang="en-US" dirty="0" smtClean="0"/>
           </a:p>
@@ -14846,13 +12938,8 @@
             </a:r>
             <a:r>
               <a:rPr lang="en-US" baseline="0" dirty="0" smtClean="0"/>
-              <a:t> mention performance, people seem to get highly defensive: performance is not a problem, we don’t have a high volume like that, you should not optimize for </a:t>
-            </a:r>
-            <a:r>
-              <a:rPr lang="en-US" baseline="0" dirty="0" smtClean="0"/>
-              <a:t>performance when you don’t have to.</a:t>
-            </a:r>
-            <a:endParaRPr lang="en-US" baseline="0" dirty="0" smtClean="0"/>
+              <a:t> mention performance, people seem to get highly defensive: performance is not a problem, we don’t have a high volume like that, you should not optimize for performance when you don’t have to.</a:t>
+            </a:r>
           </a:p>
           <a:p>
             <a:endParaRPr lang="en-US" baseline="0" dirty="0" smtClean="0"/>
@@ -14931,7 +13018,40 @@
             </a:pPr>
             <a:r>
               <a:rPr lang="en-US" baseline="0" dirty="0" smtClean="0"/>
-              <a:t>Database as a service: your service is a simple CRUD representation of the database. It kills your ability to evolve the service over time. No discoverability included: the client can’t detect features based upon metadata. </a:t>
+              <a:t>Database as a service: your service is a simple CRUD representation of the database. </a:t>
+            </a:r>
+            <a:r>
+              <a:rPr lang="en-US" baseline="0" dirty="0" smtClean="0"/>
+              <a:t>This severely decreases </a:t>
+            </a:r>
+            <a:r>
+              <a:rPr lang="en-US" baseline="0" dirty="0" smtClean="0"/>
+              <a:t>your ability to evolve the service over time</a:t>
+            </a:r>
+            <a:r>
+              <a:rPr lang="en-US" baseline="0" dirty="0" smtClean="0"/>
+              <a:t>. It is basically the lowest level of an operations based API. </a:t>
+            </a:r>
+          </a:p>
+          <a:p>
+            <a:pPr>
+              <a:buFontTx/>
+              <a:buNone/>
+            </a:pPr>
+            <a:endParaRPr lang="en-US" baseline="0" dirty="0" smtClean="0"/>
+          </a:p>
+          <a:p>
+            <a:pPr>
+              <a:buFontTx/>
+              <a:buNone/>
+            </a:pPr>
+            <a:r>
+              <a:rPr lang="en-US" baseline="0" dirty="0" smtClean="0"/>
+              <a:t>No </a:t>
+            </a:r>
+            <a:r>
+              <a:rPr lang="en-US" baseline="0" dirty="0" smtClean="0"/>
+              <a:t>discoverability included: the client can’t detect features based upon metadata. </a:t>
             </a:r>
           </a:p>
           <a:p>
@@ -15042,7 +13162,19 @@
             </a:r>
             <a:r>
               <a:rPr lang="en-US" baseline="0" dirty="0" smtClean="0"/>
-              <a:t> Messaging provides us the duality of web services. At the Bank messaging was a very common pattern, but there were very few web service built. This caused a rather unbalanced architecture where senders controlled everything and consumers were more or less ‘slaves’. For example: the sender creates a request to perform an action and sends along exactly the data needed for that operation. This creates a rather inflexible design where a change in a one single consumer (for example requiring an additional piece of data) potentially causes a change in the sender (and maybe even all other consumers).</a:t>
+              <a:t> Messaging provides us the duality of web services. At the Bank messaging was a very common pattern, but there were very few web service built. This caused a rather unbalanced architecture where senders controlled everything and consumers were more or less </a:t>
+            </a:r>
+            <a:r>
+              <a:rPr lang="en-US" baseline="0" dirty="0" smtClean="0"/>
+              <a:t>‘mindless drones’. </a:t>
+            </a:r>
+            <a:r>
+              <a:rPr lang="en-US" baseline="0" dirty="0" smtClean="0"/>
+              <a:t>For example: the sender creates a request to perform an action and sends along exactly the data needed for that operation. This creates a rather inflexible design where a change in a one single consumer (for example requiring an additional piece of data) potentially causes a change in the sender (and maybe even all other consumers</a:t>
+            </a:r>
+            <a:r>
+              <a:rPr lang="en-US" baseline="0" dirty="0" smtClean="0"/>
+              <a:t>).</a:t>
             </a:r>
           </a:p>
           <a:p>
@@ -15051,7 +13183,29 @@
           <a:p>
             <a:r>
               <a:rPr lang="en-US" baseline="0" dirty="0" smtClean="0"/>
-              <a:t>We support two scenario’s: enterprise level (transactional, fault tolerant) MSMQ and client facing (</a:t>
+              <a:t>Web services return the control to the consumer.</a:t>
+            </a:r>
+            <a:endParaRPr lang="en-US" baseline="0" dirty="0" smtClean="0"/>
+          </a:p>
+          <a:p>
+            <a:endParaRPr lang="en-US" baseline="0" dirty="0" smtClean="0"/>
+          </a:p>
+          <a:p>
+            <a:r>
+              <a:rPr lang="en-US" baseline="0" dirty="0" smtClean="0"/>
+              <a:t>We support two scenario’s: enterprise </a:t>
+            </a:r>
+            <a:r>
+              <a:rPr lang="en-US" baseline="0" dirty="0" smtClean="0"/>
+              <a:t>level messaging </a:t>
+            </a:r>
+            <a:r>
+              <a:rPr lang="en-US" baseline="0" dirty="0" smtClean="0"/>
+              <a:t>(transactional, fault tolerant) MSMQ and client facing </a:t>
+            </a:r>
+            <a:r>
+              <a:rPr lang="en-US" baseline="0" dirty="0" smtClean="0"/>
+              <a:t>messaging (</a:t>
             </a:r>
             <a:r>
               <a:rPr lang="en-US" baseline="0" dirty="0" err="1" smtClean="0"/>
@@ -15223,11 +13377,7 @@
             </a:pPr>
             <a:r>
               <a:rPr lang="en-US" dirty="0" smtClean="0"/>
-              <a:t>This is basically the same </a:t>
-            </a:r>
-            <a:r>
-              <a:rPr lang="en-US" dirty="0" smtClean="0"/>
-              <a:t>Hollywood</a:t>
+              <a:t>This is basically the same Hollywood</a:t>
             </a:r>
             <a:r>
               <a:rPr lang="en-US" baseline="0" dirty="0" smtClean="0"/>
@@ -15239,11 +13389,7 @@
             </a:r>
             <a:r>
               <a:rPr lang="en-US" i="1" dirty="0" smtClean="0"/>
-              <a:t> </a:t>
-            </a:r>
-            <a:r>
-              <a:rPr lang="en-US" i="1" dirty="0" smtClean="0"/>
-              <a:t>call us, we'll call you"</a:t>
+              <a:t> call us, we'll call you"</a:t>
             </a:r>
             <a:r>
               <a:rPr lang="en-US" dirty="0" smtClean="0"/>
@@ -15532,24 +13678,16 @@
             </a:r>
             <a:r>
               <a:rPr lang="en-US" baseline="0" dirty="0" smtClean="0"/>
-              <a:t> although it seems like a great way of guaranteed delivery of your data, messaging system have not been built to handle a large number of messages that each have a large data content. </a:t>
-            </a:r>
+              <a:t> although it seems like a great way of guaranteed delivery of your data, messaging system have not been built to handle a large number of messages that each have a large data content. An example from our environment: sending 12000 messages each night to copy 12000 rows of data between two databases.</a:t>
+            </a:r>
+          </a:p>
+          <a:p>
+            <a:endParaRPr lang="en-US" baseline="0" dirty="0" smtClean="0"/>
+          </a:p>
+          <a:p>
             <a:r>
               <a:rPr lang="en-US" baseline="0" dirty="0" smtClean="0"/>
-              <a:t>An example from our environment: sending 12000 messages each night to copy 12000 rows of data between two databases.</a:t>
-            </a:r>
-          </a:p>
-          <a:p>
-            <a:endParaRPr lang="en-US" baseline="0" dirty="0" smtClean="0"/>
-          </a:p>
-          <a:p>
-            <a:r>
-              <a:rPr lang="en-US" baseline="0" dirty="0" smtClean="0"/>
-              <a:t>It </a:t>
-            </a:r>
-            <a:r>
-              <a:rPr lang="en-US" baseline="0" dirty="0" smtClean="0"/>
-              <a:t>is an easy trap to think about a message as a transactional mechanism for copying data between two databases. It is however more appropriate to think of messaging as an asynchronous event system, although that does come with some complications around timing: you have to ensure that the data retrieved by the consumer of the message is consistent with the state of the data when the message was sent. For example: if the data was changed while the message was in transit, you might have to ensure that you can identify the original data (for example through version stamp). This will differ by scenario, but it is obviously easier when the message contains a snapshot of all relevant data at the point in time that the message was created. That approach is just not very practical.</a:t>
+              <a:t>It is an easy trap to think about a message as a transactional mechanism for copying data between two databases. It is however more appropriate to think of messaging as an asynchronous event system, although that does come with some complications around timing: you have to ensure that the data retrieved by the consumer of the message is consistent with the state of the data when the message was sent. For example: if the data was changed while the message was in transit, you might have to ensure that you can identify the original data (for example through version stamp). This will differ by scenario, but it is obviously easier when the message contains a snapshot of all relevant data at the point in time that the message was created. That approach is just not very practical.</a:t>
             </a:r>
           </a:p>
           <a:p>
@@ -15837,33 +13975,8 @@
           <a:p>
             <a:r>
               <a:rPr lang="en-US" baseline="0" dirty="0" smtClean="0"/>
-              <a:t>The core </a:t>
-            </a:r>
-            <a:r>
-              <a:rPr lang="en-US" baseline="0" dirty="0" smtClean="0"/>
-              <a:t>concept is named </a:t>
-            </a:r>
-            <a:r>
-              <a:rPr lang="en-US" baseline="0" dirty="0" smtClean="0"/>
-              <a:t>links: links with an associated name. </a:t>
-            </a:r>
-            <a:r>
-              <a:rPr lang="en-US" baseline="0" dirty="0" smtClean="0"/>
-              <a:t>You look for a link with the given name. Yes, we are now hard coding dependencies upon the name of a link. But a completely flexible discovery is complicated, because it includes semantics that are difficult to infer. You </a:t>
-            </a:r>
-            <a:r>
-              <a:rPr lang="en-US" baseline="0" dirty="0" smtClean="0"/>
-              <a:t>are however </a:t>
-            </a:r>
-            <a:r>
-              <a:rPr lang="en-US" baseline="0" dirty="0" smtClean="0"/>
-              <a:t>still achieving decoupling from physical </a:t>
-            </a:r>
-            <a:r>
-              <a:rPr lang="en-US" baseline="0" dirty="0" smtClean="0"/>
-              <a:t>URL’s. </a:t>
-            </a:r>
-            <a:endParaRPr lang="en-US" baseline="0" dirty="0" smtClean="0"/>
+              <a:t>The core concept is named links: links with an associated name. You look for a link with the given name. Yes, we are now hard coding dependencies upon the name of a link. But a completely flexible discovery is complicated, because it includes semantics that are difficult to infer. You are however still achieving decoupling from physical URL’s. </a:t>
+            </a:r>
           </a:p>
           <a:p>
             <a:endParaRPr lang="en-US" baseline="0" dirty="0" smtClean="0"/>
@@ -16884,19 +14997,7 @@
               <a:rPr lang="en-US" baseline="0" dirty="0" smtClean="0">
                 <a:sym typeface="Wingdings" pitchFamily="2" charset="2"/>
               </a:rPr>
-              <a:t>We </a:t>
-            </a:r>
-            <a:r>
-              <a:rPr lang="en-US" baseline="0" dirty="0" smtClean="0">
-                <a:sym typeface="Wingdings" pitchFamily="2" charset="2"/>
-              </a:rPr>
-              <a:t>hope that </a:t>
-            </a:r>
-            <a:r>
-              <a:rPr lang="en-US" baseline="0" dirty="0" smtClean="0">
-                <a:sym typeface="Wingdings" pitchFamily="2" charset="2"/>
-              </a:rPr>
-              <a:t>the design philosophy and architecture we shared today will inspire and help you.</a:t>
+              <a:t>We hope that the design philosophy and architecture we shared today will inspire and help you.</a:t>
             </a:r>
           </a:p>
           <a:p>
@@ -17543,15 +15644,7 @@
             </a:r>
             <a:r>
               <a:rPr lang="en-US" baseline="0" dirty="0" smtClean="0"/>
-              <a:t>. There are different design approaches, each valid in </a:t>
-            </a:r>
-            <a:r>
-              <a:rPr lang="en-US" baseline="0" dirty="0" smtClean="0"/>
-              <a:t>their </a:t>
-            </a:r>
-            <a:r>
-              <a:rPr lang="en-US" baseline="0" dirty="0" smtClean="0"/>
-              <a:t>own right. </a:t>
+              <a:t>. There are different design approaches, each valid in their own right. </a:t>
             </a:r>
           </a:p>
           <a:p>
@@ -23975,11 +22068,7 @@
             </a:r>
             <a:r>
               <a:rPr lang="en-US" smtClean="0"/>
-              <a:t>, </a:t>
-            </a:r>
-            <a:r>
-              <a:rPr lang="en-US" smtClean="0"/>
-              <a:t>strategy </a:t>
+              <a:t>, strategy </a:t>
             </a:r>
             <a:r>
               <a:rPr lang="en-US" dirty="0" smtClean="0"/>

</xml_diff>